<commit_message>
Additional Database changes 1
</commit_message>
<xml_diff>
--- a/Database Logic.pptx
+++ b/Database Logic.pptx
@@ -10,8 +10,8 @@
     <p:sldId id="261" r:id="rId4"/>
     <p:sldId id="257" r:id="rId5"/>
     <p:sldId id="263" r:id="rId6"/>
-    <p:sldId id="258" r:id="rId7"/>
-    <p:sldId id="264" r:id="rId8"/>
+    <p:sldId id="264" r:id="rId7"/>
+    <p:sldId id="258" r:id="rId8"/>
     <p:sldId id="260" r:id="rId9"/>
     <p:sldId id="259" r:id="rId10"/>
   </p:sldIdLst>
@@ -269,7 +269,7 @@
           <a:p>
             <a:fld id="{8E38A466-912F-4638-A4B7-9291465C9E2A}" type="datetimeFigureOut">
               <a:rPr lang="hr-HR" smtClean="0"/>
-              <a:t>4.3.2020.</a:t>
+              <a:t>5.3.2020.</a:t>
             </a:fld>
             <a:endParaRPr lang="hr-HR"/>
           </a:p>
@@ -469,7 +469,7 @@
           <a:p>
             <a:fld id="{8E38A466-912F-4638-A4B7-9291465C9E2A}" type="datetimeFigureOut">
               <a:rPr lang="hr-HR" smtClean="0"/>
-              <a:t>4.3.2020.</a:t>
+              <a:t>5.3.2020.</a:t>
             </a:fld>
             <a:endParaRPr lang="hr-HR"/>
           </a:p>
@@ -679,7 +679,7 @@
           <a:p>
             <a:fld id="{8E38A466-912F-4638-A4B7-9291465C9E2A}" type="datetimeFigureOut">
               <a:rPr lang="hr-HR" smtClean="0"/>
-              <a:t>4.3.2020.</a:t>
+              <a:t>5.3.2020.</a:t>
             </a:fld>
             <a:endParaRPr lang="hr-HR"/>
           </a:p>
@@ -879,7 +879,7 @@
           <a:p>
             <a:fld id="{8E38A466-912F-4638-A4B7-9291465C9E2A}" type="datetimeFigureOut">
               <a:rPr lang="hr-HR" smtClean="0"/>
-              <a:t>4.3.2020.</a:t>
+              <a:t>5.3.2020.</a:t>
             </a:fld>
             <a:endParaRPr lang="hr-HR"/>
           </a:p>
@@ -1155,7 +1155,7 @@
           <a:p>
             <a:fld id="{8E38A466-912F-4638-A4B7-9291465C9E2A}" type="datetimeFigureOut">
               <a:rPr lang="hr-HR" smtClean="0"/>
-              <a:t>4.3.2020.</a:t>
+              <a:t>5.3.2020.</a:t>
             </a:fld>
             <a:endParaRPr lang="hr-HR"/>
           </a:p>
@@ -1423,7 +1423,7 @@
           <a:p>
             <a:fld id="{8E38A466-912F-4638-A4B7-9291465C9E2A}" type="datetimeFigureOut">
               <a:rPr lang="hr-HR" smtClean="0"/>
-              <a:t>4.3.2020.</a:t>
+              <a:t>5.3.2020.</a:t>
             </a:fld>
             <a:endParaRPr lang="hr-HR"/>
           </a:p>
@@ -1838,7 +1838,7 @@
           <a:p>
             <a:fld id="{8E38A466-912F-4638-A4B7-9291465C9E2A}" type="datetimeFigureOut">
               <a:rPr lang="hr-HR" smtClean="0"/>
-              <a:t>4.3.2020.</a:t>
+              <a:t>5.3.2020.</a:t>
             </a:fld>
             <a:endParaRPr lang="hr-HR"/>
           </a:p>
@@ -1980,7 +1980,7 @@
           <a:p>
             <a:fld id="{8E38A466-912F-4638-A4B7-9291465C9E2A}" type="datetimeFigureOut">
               <a:rPr lang="hr-HR" smtClean="0"/>
-              <a:t>4.3.2020.</a:t>
+              <a:t>5.3.2020.</a:t>
             </a:fld>
             <a:endParaRPr lang="hr-HR"/>
           </a:p>
@@ -2093,7 +2093,7 @@
           <a:p>
             <a:fld id="{8E38A466-912F-4638-A4B7-9291465C9E2A}" type="datetimeFigureOut">
               <a:rPr lang="hr-HR" smtClean="0"/>
-              <a:t>4.3.2020.</a:t>
+              <a:t>5.3.2020.</a:t>
             </a:fld>
             <a:endParaRPr lang="hr-HR"/>
           </a:p>
@@ -2406,7 +2406,7 @@
           <a:p>
             <a:fld id="{8E38A466-912F-4638-A4B7-9291465C9E2A}" type="datetimeFigureOut">
               <a:rPr lang="hr-HR" smtClean="0"/>
-              <a:t>4.3.2020.</a:t>
+              <a:t>5.3.2020.</a:t>
             </a:fld>
             <a:endParaRPr lang="hr-HR"/>
           </a:p>
@@ -2695,7 +2695,7 @@
           <a:p>
             <a:fld id="{8E38A466-912F-4638-A4B7-9291465C9E2A}" type="datetimeFigureOut">
               <a:rPr lang="hr-HR" smtClean="0"/>
-              <a:t>4.3.2020.</a:t>
+              <a:t>5.3.2020.</a:t>
             </a:fld>
             <a:endParaRPr lang="hr-HR"/>
           </a:p>
@@ -2938,7 +2938,7 @@
           <a:p>
             <a:fld id="{8E38A466-912F-4638-A4B7-9291465C9E2A}" type="datetimeFigureOut">
               <a:rPr lang="hr-HR" smtClean="0"/>
-              <a:t>4.3.2020.</a:t>
+              <a:t>5.3.2020.</a:t>
             </a:fld>
             <a:endParaRPr lang="hr-HR"/>
           </a:p>
@@ -3914,8 +3914,8 @@
           <a:p>
             <a:pPr algn="ctr"/>
             <a:r>
-              <a:rPr lang="en-US" sz="1600" dirty="0" err="1"/>
-              <a:t>matches_per_ticket</a:t>
+              <a:rPr lang="en-US" sz="1600" dirty="0"/>
+              <a:t>Ticket Odds</a:t>
             </a:r>
             <a:endParaRPr lang="hr-HR" sz="1600" dirty="0"/>
           </a:p>
@@ -4488,6 +4488,42 @@
           </a:p>
         </p:txBody>
       </p:sp>
+      <p:sp>
+        <p:nvSpPr>
+          <p:cNvPr id="3" name="TextBox 2">
+            <a:extLst>
+              <a:ext uri="{FF2B5EF4-FFF2-40B4-BE49-F238E27FC236}">
+                <a16:creationId xmlns:a16="http://schemas.microsoft.com/office/drawing/2014/main" id="{DE4F0847-026E-4705-B8FE-8BE63CFA1C1C}"/>
+              </a:ext>
+            </a:extLst>
+          </p:cNvPr>
+          <p:cNvSpPr txBox="1"/>
+          <p:nvPr/>
+        </p:nvSpPr>
+        <p:spPr>
+          <a:xfrm>
+            <a:off x="834887" y="6003235"/>
+            <a:ext cx="8490914" cy="369332"/>
+          </a:xfrm>
+          <a:prstGeom prst="rect">
+            <a:avLst/>
+          </a:prstGeom>
+          <a:noFill/>
+        </p:spPr>
+        <p:txBody>
+          <a:bodyPr wrap="none" rtlCol="0">
+            <a:spAutoFit/>
+          </a:bodyPr>
+          <a:lstStyle/>
+          <a:p>
+            <a:r>
+              <a:rPr lang="en-US" dirty="0"/>
+              <a:t>In the next slides, data is not the same as in “real” database… it’s just an representation…</a:t>
+            </a:r>
+            <a:endParaRPr lang="hr-HR" dirty="0"/>
+          </a:p>
+        </p:txBody>
+      </p:sp>
     </p:spTree>
     <p:extLst>
       <p:ext uri="{BB962C8B-B14F-4D97-AF65-F5344CB8AC3E}">
@@ -5523,7 +5559,7 @@
         </p:nvSpPr>
         <p:spPr>
           <a:xfrm>
-            <a:off x="1569311" y="5636472"/>
+            <a:off x="1488727" y="5566377"/>
             <a:ext cx="4633777" cy="369332"/>
           </a:xfrm>
           <a:prstGeom prst="rect">
@@ -5561,7 +5597,7 @@
         </p:nvCxnSpPr>
         <p:spPr>
           <a:xfrm flipV="1">
-            <a:off x="3793525" y="5103988"/>
+            <a:off x="3726193" y="5033893"/>
             <a:ext cx="0" cy="532484"/>
           </a:xfrm>
           <a:prstGeom prst="straightConnector1">
@@ -6079,14 +6115,14 @@
           <p:nvPr>
             <p:extLst>
               <p:ext uri="{D42A27DB-BD31-4B8C-83A1-F6EECF244321}">
-                <p14:modId xmlns:p14="http://schemas.microsoft.com/office/powerpoint/2010/main" val="2858755360"/>
+                <p14:modId xmlns:p14="http://schemas.microsoft.com/office/powerpoint/2010/main" val="3356341448"/>
               </p:ext>
             </p:extLst>
           </p:nvPr>
         </p:nvGraphicFramePr>
         <p:xfrm>
-          <a:off x="605474" y="2288974"/>
-          <a:ext cx="3757883" cy="3606800"/>
+          <a:off x="605473" y="2288974"/>
+          <a:ext cx="5742316" cy="3332480"/>
         </p:xfrm>
         <a:graphic>
           <a:graphicData uri="http://schemas.openxmlformats.org/drawingml/2006/table">
@@ -6095,22 +6131,36 @@
                 <a:tableStyleId>{5C22544A-7EE6-4342-B048-85BDC9FD1C3A}</a:tableStyleId>
               </a:tblPr>
               <a:tblGrid>
-                <a:gridCol w="1733037">
+                <a:gridCol w="1713657">
                   <a:extLst>
                     <a:ext uri="{9D8B030D-6E8A-4147-A177-3AD203B41FA5}">
                       <a16:colId xmlns:a16="http://schemas.microsoft.com/office/drawing/2014/main" val="3385109042"/>
                     </a:ext>
                   </a:extLst>
                 </a:gridCol>
-                <a:gridCol w="2024846">
+                <a:gridCol w="1537253">
                   <a:extLst>
                     <a:ext uri="{9D8B030D-6E8A-4147-A177-3AD203B41FA5}">
                       <a16:colId xmlns:a16="http://schemas.microsoft.com/office/drawing/2014/main" val="2195485728"/>
                     </a:ext>
                   </a:extLst>
                 </a:gridCol>
+                <a:gridCol w="1192695">
+                  <a:extLst>
+                    <a:ext uri="{9D8B030D-6E8A-4147-A177-3AD203B41FA5}">
+                      <a16:colId xmlns:a16="http://schemas.microsoft.com/office/drawing/2014/main" val="1545865222"/>
+                    </a:ext>
+                  </a:extLst>
+                </a:gridCol>
+                <a:gridCol w="1298711">
+                  <a:extLst>
+                    <a:ext uri="{9D8B030D-6E8A-4147-A177-3AD203B41FA5}">
+                      <a16:colId xmlns:a16="http://schemas.microsoft.com/office/drawing/2014/main" val="1990380934"/>
+                    </a:ext>
+                  </a:extLst>
+                </a:gridCol>
               </a:tblGrid>
-              <a:tr h="370840">
+              <a:tr h="184986">
                 <a:tc>
                   <a:txBody>
                     <a:bodyPr/>
@@ -6186,8 +6236,34 @@
                         </a:solidFill>
                       </a:endParaRPr>
                     </a:p>
-                    <a:p>
-                      <a:pPr algn="ctr"/>
+                  </a:txBody>
+                  <a:tcPr/>
+                </a:tc>
+                <a:tc>
+                  <a:txBody>
+                    <a:bodyPr/>
+                    <a:lstStyle/>
+                    <a:p>
+                      <a:pPr algn="ctr"/>
+                      <a:r>
+                        <a:rPr lang="en-US" dirty="0"/>
+                        <a:t>Odd</a:t>
+                      </a:r>
+                      <a:endParaRPr lang="hr-HR" dirty="0"/>
+                    </a:p>
+                  </a:txBody>
+                  <a:tcPr/>
+                </a:tc>
+                <a:tc>
+                  <a:txBody>
+                    <a:bodyPr/>
+                    <a:lstStyle/>
+                    <a:p>
+                      <a:pPr algn="ctr"/>
+                      <a:r>
+                        <a:rPr lang="en-US" dirty="0"/>
+                        <a:t>Type</a:t>
+                      </a:r>
                       <a:endParaRPr lang="hr-HR" dirty="0"/>
                     </a:p>
                   </a:txBody>
@@ -6230,6 +6306,36 @@
                   </a:txBody>
                   <a:tcPr/>
                 </a:tc>
+                <a:tc>
+                  <a:txBody>
+                    <a:bodyPr/>
+                    <a:lstStyle/>
+                    <a:p>
+                      <a:pPr algn="ctr"/>
+                      <a:r>
+                        <a:rPr lang="en-US" dirty="0"/>
+                        <a:t>1.8</a:t>
+                      </a:r>
+                      <a:endParaRPr lang="hr-HR" dirty="0"/>
+                    </a:p>
+                  </a:txBody>
+                  <a:tcPr/>
+                </a:tc>
+                <a:tc>
+                  <a:txBody>
+                    <a:bodyPr/>
+                    <a:lstStyle/>
+                    <a:p>
+                      <a:pPr algn="ctr"/>
+                      <a:r>
+                        <a:rPr lang="en-US" dirty="0"/>
+                        <a:t>1</a:t>
+                      </a:r>
+                      <a:endParaRPr lang="hr-HR" dirty="0"/>
+                    </a:p>
+                  </a:txBody>
+                  <a:tcPr/>
+                </a:tc>
                 <a:extLst>
                   <a:ext uri="{0D108BD9-81ED-4DB2-BD59-A6C34878D82A}">
                     <a16:rowId xmlns:a16="http://schemas.microsoft.com/office/drawing/2014/main" val="3920316459"/>
@@ -6267,6 +6373,36 @@
                   </a:txBody>
                   <a:tcPr/>
                 </a:tc>
+                <a:tc>
+                  <a:txBody>
+                    <a:bodyPr/>
+                    <a:lstStyle/>
+                    <a:p>
+                      <a:pPr algn="ctr"/>
+                      <a:r>
+                        <a:rPr lang="en-US" dirty="0"/>
+                        <a:t>2.4</a:t>
+                      </a:r>
+                      <a:endParaRPr lang="hr-HR" dirty="0"/>
+                    </a:p>
+                  </a:txBody>
+                  <a:tcPr/>
+                </a:tc>
+                <a:tc>
+                  <a:txBody>
+                    <a:bodyPr/>
+                    <a:lstStyle/>
+                    <a:p>
+                      <a:pPr algn="ctr"/>
+                      <a:r>
+                        <a:rPr lang="en-US" dirty="0"/>
+                        <a:t>X2</a:t>
+                      </a:r>
+                      <a:endParaRPr lang="hr-HR" dirty="0"/>
+                    </a:p>
+                  </a:txBody>
+                  <a:tcPr/>
+                </a:tc>
                 <a:extLst>
                   <a:ext uri="{0D108BD9-81ED-4DB2-BD59-A6C34878D82A}">
                     <a16:rowId xmlns:a16="http://schemas.microsoft.com/office/drawing/2014/main" val="1966806956"/>
@@ -6298,6 +6434,36 @@
                       <a:r>
                         <a:rPr lang="en-US" dirty="0"/>
                         <a:t>3</a:t>
+                      </a:r>
+                      <a:endParaRPr lang="hr-HR" dirty="0"/>
+                    </a:p>
+                  </a:txBody>
+                  <a:tcPr/>
+                </a:tc>
+                <a:tc>
+                  <a:txBody>
+                    <a:bodyPr/>
+                    <a:lstStyle/>
+                    <a:p>
+                      <a:pPr algn="ctr"/>
+                      <a:r>
+                        <a:rPr lang="en-US" dirty="0"/>
+                        <a:t>1.8</a:t>
+                      </a:r>
+                      <a:endParaRPr lang="hr-HR" dirty="0"/>
+                    </a:p>
+                  </a:txBody>
+                  <a:tcPr/>
+                </a:tc>
+                <a:tc>
+                  <a:txBody>
+                    <a:bodyPr/>
+                    <a:lstStyle/>
+                    <a:p>
+                      <a:pPr algn="ctr"/>
+                      <a:r>
+                        <a:rPr lang="en-US" dirty="0"/>
+                        <a:t>&gt;=2.5h</a:t>
                       </a:r>
                       <a:endParaRPr lang="hr-HR" dirty="0"/>
                     </a:p>
@@ -6357,65 +6523,6 @@
                   </a:txBody>
                   <a:tcPr/>
                 </a:tc>
-                <a:extLst>
-                  <a:ext uri="{0D108BD9-81ED-4DB2-BD59-A6C34878D82A}">
-                    <a16:rowId xmlns:a16="http://schemas.microsoft.com/office/drawing/2014/main" val="1578616602"/>
-                  </a:ext>
-                </a:extLst>
-              </a:tr>
-              <a:tr h="370840">
-                <a:tc>
-                  <a:txBody>
-                    <a:bodyPr/>
-                    <a:lstStyle/>
-                    <a:p>
-                      <a:pPr algn="ctr"/>
-                      <a:r>
-                        <a:rPr lang="en-US" dirty="0"/>
-                        <a:t>2</a:t>
-                      </a:r>
-                      <a:endParaRPr lang="hr-HR" dirty="0"/>
-                    </a:p>
-                  </a:txBody>
-                  <a:tcPr/>
-                </a:tc>
-                <a:tc>
-                  <a:txBody>
-                    <a:bodyPr/>
-                    <a:lstStyle/>
-                    <a:p>
-                      <a:pPr algn="ctr"/>
-                      <a:r>
-                        <a:rPr lang="en-US" dirty="0"/>
-                        <a:t>5</a:t>
-                      </a:r>
-                      <a:endParaRPr lang="hr-HR" dirty="0"/>
-                    </a:p>
-                  </a:txBody>
-                  <a:tcPr/>
-                </a:tc>
-                <a:extLst>
-                  <a:ext uri="{0D108BD9-81ED-4DB2-BD59-A6C34878D82A}">
-                    <a16:rowId xmlns:a16="http://schemas.microsoft.com/office/drawing/2014/main" val="3979223038"/>
-                  </a:ext>
-                </a:extLst>
-              </a:tr>
-              <a:tr h="370840">
-                <a:tc>
-                  <a:txBody>
-                    <a:bodyPr/>
-                    <a:lstStyle/>
-                    <a:p>
-                      <a:pPr algn="ctr"/>
-                      <a:r>
-                        <a:rPr lang="en-US" dirty="0"/>
-                        <a:t>3</a:t>
-                      </a:r>
-                      <a:endParaRPr lang="hr-HR" dirty="0"/>
-                    </a:p>
-                  </a:txBody>
-                  <a:tcPr/>
-                </a:tc>
                 <a:tc>
                   <a:txBody>
                     <a:bodyPr/>
@@ -6440,7 +6547,220 @@
                       </a:pPr>
                       <a:r>
                         <a:rPr lang="en-US" dirty="0"/>
+                        <a:t>2.5</a:t>
+                      </a:r>
+                      <a:endParaRPr lang="hr-HR" dirty="0"/>
+                    </a:p>
+                  </a:txBody>
+                  <a:tcPr/>
+                </a:tc>
+                <a:tc>
+                  <a:txBody>
+                    <a:bodyPr/>
+                    <a:lstStyle/>
+                    <a:p>
+                      <a:pPr marL="0" marR="0" lvl="0" indent="0" algn="ctr" defTabSz="914400" rtl="0" eaLnBrk="1" fontAlgn="auto" latinLnBrk="0" hangingPunct="1">
+                        <a:lnSpc>
+                          <a:spcPct val="100000"/>
+                        </a:lnSpc>
+                        <a:spcBef>
+                          <a:spcPts val="0"/>
+                        </a:spcBef>
+                        <a:spcAft>
+                          <a:spcPts val="0"/>
+                        </a:spcAft>
+                        <a:buClrTx/>
+                        <a:buSzTx/>
+                        <a:buFontTx/>
+                        <a:buNone/>
+                        <a:tabLst/>
+                        <a:defRPr/>
+                      </a:pPr>
+                      <a:r>
+                        <a:rPr lang="en-US" dirty="0"/>
+                        <a:t>1H10</a:t>
+                      </a:r>
+                      <a:endParaRPr lang="hr-HR" dirty="0"/>
+                    </a:p>
+                  </a:txBody>
+                  <a:tcPr/>
+                </a:tc>
+                <a:extLst>
+                  <a:ext uri="{0D108BD9-81ED-4DB2-BD59-A6C34878D82A}">
+                    <a16:rowId xmlns:a16="http://schemas.microsoft.com/office/drawing/2014/main" val="1578616602"/>
+                  </a:ext>
+                </a:extLst>
+              </a:tr>
+              <a:tr h="370840">
+                <a:tc>
+                  <a:txBody>
+                    <a:bodyPr/>
+                    <a:lstStyle/>
+                    <a:p>
+                      <a:pPr algn="ctr"/>
+                      <a:r>
+                        <a:rPr lang="en-US" dirty="0"/>
+                        <a:t>2</a:t>
+                      </a:r>
+                      <a:endParaRPr lang="hr-HR" dirty="0"/>
+                    </a:p>
+                  </a:txBody>
+                  <a:tcPr/>
+                </a:tc>
+                <a:tc>
+                  <a:txBody>
+                    <a:bodyPr/>
+                    <a:lstStyle/>
+                    <a:p>
+                      <a:pPr algn="ctr"/>
+                      <a:r>
+                        <a:rPr lang="en-US" dirty="0"/>
+                        <a:t>5</a:t>
+                      </a:r>
+                      <a:endParaRPr lang="hr-HR" dirty="0"/>
+                    </a:p>
+                  </a:txBody>
+                  <a:tcPr/>
+                </a:tc>
+                <a:tc>
+                  <a:txBody>
+                    <a:bodyPr/>
+                    <a:lstStyle/>
+                    <a:p>
+                      <a:pPr algn="ctr"/>
+                      <a:r>
+                        <a:rPr lang="en-US" dirty="0"/>
+                        <a:t>29</a:t>
+                      </a:r>
+                      <a:endParaRPr lang="hr-HR" dirty="0"/>
+                    </a:p>
+                  </a:txBody>
+                  <a:tcPr/>
+                </a:tc>
+                <a:tc>
+                  <a:txBody>
+                    <a:bodyPr/>
+                    <a:lstStyle/>
+                    <a:p>
+                      <a:pPr algn="ctr"/>
+                      <a:r>
+                        <a:rPr lang="en-US" dirty="0"/>
+                        <a:t>2</a:t>
+                      </a:r>
+                      <a:endParaRPr lang="hr-HR" dirty="0"/>
+                    </a:p>
+                  </a:txBody>
+                  <a:tcPr/>
+                </a:tc>
+                <a:extLst>
+                  <a:ext uri="{0D108BD9-81ED-4DB2-BD59-A6C34878D82A}">
+                    <a16:rowId xmlns:a16="http://schemas.microsoft.com/office/drawing/2014/main" val="3979223038"/>
+                  </a:ext>
+                </a:extLst>
+              </a:tr>
+              <a:tr h="370840">
+                <a:tc>
+                  <a:txBody>
+                    <a:bodyPr/>
+                    <a:lstStyle/>
+                    <a:p>
+                      <a:pPr algn="ctr"/>
+                      <a:r>
+                        <a:rPr lang="en-US" dirty="0"/>
+                        <a:t>3</a:t>
+                      </a:r>
+                      <a:endParaRPr lang="hr-HR" dirty="0"/>
+                    </a:p>
+                  </a:txBody>
+                  <a:tcPr/>
+                </a:tc>
+                <a:tc>
+                  <a:txBody>
+                    <a:bodyPr/>
+                    <a:lstStyle/>
+                    <a:p>
+                      <a:pPr marL="0" marR="0" lvl="0" indent="0" algn="ctr" defTabSz="914400" rtl="0" eaLnBrk="1" fontAlgn="auto" latinLnBrk="0" hangingPunct="1">
+                        <a:lnSpc>
+                          <a:spcPct val="100000"/>
+                        </a:lnSpc>
+                        <a:spcBef>
+                          <a:spcPts val="0"/>
+                        </a:spcBef>
+                        <a:spcAft>
+                          <a:spcPts val="0"/>
+                        </a:spcAft>
+                        <a:buClrTx/>
+                        <a:buSzTx/>
+                        <a:buFontTx/>
+                        <a:buNone/>
+                        <a:tabLst/>
+                        <a:defRPr/>
+                      </a:pPr>
+                      <a:r>
+                        <a:rPr lang="en-US" dirty="0"/>
                         <a:t>1</a:t>
+                      </a:r>
+                      <a:endParaRPr lang="hr-HR" dirty="0"/>
+                    </a:p>
+                  </a:txBody>
+                  <a:tcPr/>
+                </a:tc>
+                <a:tc>
+                  <a:txBody>
+                    <a:bodyPr/>
+                    <a:lstStyle/>
+                    <a:p>
+                      <a:pPr marL="0" marR="0" lvl="0" indent="0" algn="ctr" defTabSz="914400" rtl="0" eaLnBrk="1" fontAlgn="auto" latinLnBrk="0" hangingPunct="1">
+                        <a:lnSpc>
+                          <a:spcPct val="100000"/>
+                        </a:lnSpc>
+                        <a:spcBef>
+                          <a:spcPts val="0"/>
+                        </a:spcBef>
+                        <a:spcAft>
+                          <a:spcPts val="0"/>
+                        </a:spcAft>
+                        <a:buClrTx/>
+                        <a:buSzTx/>
+                        <a:buFontTx/>
+                        <a:buNone/>
+                        <a:tabLst/>
+                        <a:defRPr/>
+                      </a:pPr>
+                      <a:r>
+                        <a:rPr lang="en-US" dirty="0"/>
+                        <a:t>1.7</a:t>
+                      </a:r>
+                      <a:endParaRPr lang="hr-HR" dirty="0"/>
+                    </a:p>
+                  </a:txBody>
+                  <a:tcPr/>
+                </a:tc>
+                <a:tc>
+                  <a:txBody>
+                    <a:bodyPr/>
+                    <a:lstStyle/>
+                    <a:p>
+                      <a:pPr marL="0" marR="0" lvl="0" indent="0" algn="ctr" defTabSz="914400" rtl="0" eaLnBrk="1" fontAlgn="auto" latinLnBrk="0" hangingPunct="1">
+                        <a:lnSpc>
+                          <a:spcPct val="100000"/>
+                        </a:lnSpc>
+                        <a:spcBef>
+                          <a:spcPts val="0"/>
+                        </a:spcBef>
+                        <a:spcAft>
+                          <a:spcPts val="0"/>
+                        </a:spcAft>
+                        <a:buClrTx/>
+                        <a:buSzTx/>
+                        <a:buFontTx/>
+                        <a:buNone/>
+                        <a:tabLst/>
+                        <a:defRPr/>
+                      </a:pPr>
+                      <a:r>
+                        <a:rPr lang="en-US" dirty="0"/>
+                        <a:t>12</a:t>
                       </a:r>
                       <a:endParaRPr lang="hr-HR" dirty="0"/>
                     </a:p>
@@ -6484,6 +6804,36 @@
                   </a:txBody>
                   <a:tcPr/>
                 </a:tc>
+                <a:tc>
+                  <a:txBody>
+                    <a:bodyPr/>
+                    <a:lstStyle/>
+                    <a:p>
+                      <a:pPr algn="ctr"/>
+                      <a:r>
+                        <a:rPr lang="en-US" dirty="0"/>
+                        <a:t>2.8</a:t>
+                      </a:r>
+                      <a:endParaRPr lang="hr-HR" dirty="0"/>
+                    </a:p>
+                  </a:txBody>
+                  <a:tcPr/>
+                </a:tc>
+                <a:tc>
+                  <a:txBody>
+                    <a:bodyPr/>
+                    <a:lstStyle/>
+                    <a:p>
+                      <a:pPr algn="ctr"/>
+                      <a:r>
+                        <a:rPr lang="en-US" dirty="0"/>
+                        <a:t>2H10</a:t>
+                      </a:r>
+                      <a:endParaRPr lang="hr-HR" dirty="0"/>
+                    </a:p>
+                  </a:txBody>
+                  <a:tcPr/>
+                </a:tc>
                 <a:extLst>
                   <a:ext uri="{0D108BD9-81ED-4DB2-BD59-A6C34878D82A}">
                     <a16:rowId xmlns:a16="http://schemas.microsoft.com/office/drawing/2014/main" val="1832563792"/>
@@ -6515,6 +6865,36 @@
                       <a:r>
                         <a:rPr lang="en-US" dirty="0"/>
                         <a:t>4</a:t>
+                      </a:r>
+                      <a:endParaRPr lang="hr-HR" dirty="0"/>
+                    </a:p>
+                  </a:txBody>
+                  <a:tcPr/>
+                </a:tc>
+                <a:tc>
+                  <a:txBody>
+                    <a:bodyPr/>
+                    <a:lstStyle/>
+                    <a:p>
+                      <a:pPr algn="ctr"/>
+                      <a:r>
+                        <a:rPr lang="en-US" dirty="0"/>
+                        <a:t>100.0</a:t>
+                      </a:r>
+                      <a:endParaRPr lang="hr-HR" dirty="0"/>
+                    </a:p>
+                  </a:txBody>
+                  <a:tcPr/>
+                </a:tc>
+                <a:tc>
+                  <a:txBody>
+                    <a:bodyPr/>
+                    <a:lstStyle/>
+                    <a:p>
+                      <a:pPr algn="ctr"/>
+                      <a:r>
+                        <a:rPr lang="en-US" dirty="0"/>
+                        <a:t>Canceled</a:t>
                       </a:r>
                       <a:endParaRPr lang="hr-HR" dirty="0"/>
                     </a:p>
@@ -6574,8 +6954,8 @@
           <a:p>
             <a:pPr algn="ctr"/>
             <a:r>
-              <a:rPr lang="en-US" sz="1600" dirty="0" err="1"/>
-              <a:t>matches_per_ticket</a:t>
+              <a:rPr lang="en-US" sz="1600" dirty="0"/>
+              <a:t>Ticket Odds</a:t>
             </a:r>
             <a:endParaRPr lang="hr-HR" sz="1600" dirty="0"/>
           </a:p>
@@ -6595,797 +6975,6 @@
 </file>
 
 <file path=ppt/slides/slide6.xml><?xml version="1.0" encoding="utf-8"?>
-<p:sld xmlns:a="http://schemas.openxmlformats.org/drawingml/2006/main" xmlns:r="http://schemas.openxmlformats.org/officeDocument/2006/relationships" xmlns:p="http://schemas.openxmlformats.org/presentationml/2006/main">
-  <p:cSld>
-    <p:spTree>
-      <p:nvGrpSpPr>
-        <p:cNvPr id="1" name=""/>
-        <p:cNvGrpSpPr/>
-        <p:nvPr/>
-      </p:nvGrpSpPr>
-      <p:grpSpPr>
-        <a:xfrm>
-          <a:off x="0" y="0"/>
-          <a:ext cx="0" cy="0"/>
-          <a:chOff x="0" y="0"/>
-          <a:chExt cx="0" cy="0"/>
-        </a:xfrm>
-      </p:grpSpPr>
-      <p:sp>
-        <p:nvSpPr>
-          <p:cNvPr id="4" name="Rectangle 3">
-            <a:extLst>
-              <a:ext uri="{FF2B5EF4-FFF2-40B4-BE49-F238E27FC236}">
-                <a16:creationId xmlns:a16="http://schemas.microsoft.com/office/drawing/2014/main" id="{1E9DCB2C-BC60-40EF-A76B-C116E74B2D55}"/>
-              </a:ext>
-            </a:extLst>
-          </p:cNvPr>
-          <p:cNvSpPr/>
-          <p:nvPr/>
-        </p:nvSpPr>
-        <p:spPr>
-          <a:xfrm>
-            <a:off x="605482" y="313036"/>
-            <a:ext cx="2743200" cy="1062681"/>
-          </a:xfrm>
-          <a:prstGeom prst="rect">
-            <a:avLst/>
-          </a:prstGeom>
-        </p:spPr>
-        <p:style>
-          <a:lnRef idx="2">
-            <a:schemeClr val="accent1">
-              <a:shade val="50000"/>
-            </a:schemeClr>
-          </a:lnRef>
-          <a:fillRef idx="1">
-            <a:schemeClr val="accent1"/>
-          </a:fillRef>
-          <a:effectRef idx="0">
-            <a:schemeClr val="accent1"/>
-          </a:effectRef>
-          <a:fontRef idx="minor">
-            <a:schemeClr val="lt1"/>
-          </a:fontRef>
-        </p:style>
-        <p:txBody>
-          <a:bodyPr rtlCol="0" anchor="ctr"/>
-          <a:lstStyle/>
-          <a:p>
-            <a:pPr algn="ctr"/>
-            <a:r>
-              <a:rPr lang="en-US" dirty="0"/>
-              <a:t>Match</a:t>
-            </a:r>
-            <a:endParaRPr lang="hr-HR" dirty="0"/>
-          </a:p>
-        </p:txBody>
-      </p:sp>
-      <p:graphicFrame>
-        <p:nvGraphicFramePr>
-          <p:cNvPr id="2" name="Table 2">
-            <a:extLst>
-              <a:ext uri="{FF2B5EF4-FFF2-40B4-BE49-F238E27FC236}">
-                <a16:creationId xmlns:a16="http://schemas.microsoft.com/office/drawing/2014/main" id="{16FCD44F-8466-477E-BD23-48CA7ED90A43}"/>
-              </a:ext>
-            </a:extLst>
-          </p:cNvPr>
-          <p:cNvGraphicFramePr>
-            <a:graphicFrameLocks noGrp="1"/>
-          </p:cNvGraphicFramePr>
-          <p:nvPr>
-            <p:extLst>
-              <p:ext uri="{D42A27DB-BD31-4B8C-83A1-F6EECF244321}">
-                <p14:modId xmlns:p14="http://schemas.microsoft.com/office/powerpoint/2010/main" val="1098985385"/>
-              </p:ext>
-            </p:extLst>
-          </p:nvPr>
-        </p:nvGraphicFramePr>
-        <p:xfrm>
-          <a:off x="189470" y="2709104"/>
-          <a:ext cx="7298009" cy="2214880"/>
-        </p:xfrm>
-        <a:graphic>
-          <a:graphicData uri="http://schemas.openxmlformats.org/drawingml/2006/table">
-            <a:tbl>
-              <a:tblPr firstRow="1" bandRow="1">
-                <a:tableStyleId>{5C22544A-7EE6-4342-B048-85BDC9FD1C3A}</a:tableStyleId>
-              </a:tblPr>
-              <a:tblGrid>
-                <a:gridCol w="1126973">
-                  <a:extLst>
-                    <a:ext uri="{9D8B030D-6E8A-4147-A177-3AD203B41FA5}">
-                      <a16:colId xmlns:a16="http://schemas.microsoft.com/office/drawing/2014/main" val="3459061120"/>
-                    </a:ext>
-                  </a:extLst>
-                </a:gridCol>
-                <a:gridCol w="1461014">
-                  <a:extLst>
-                    <a:ext uri="{9D8B030D-6E8A-4147-A177-3AD203B41FA5}">
-                      <a16:colId xmlns:a16="http://schemas.microsoft.com/office/drawing/2014/main" val="3556585"/>
-                    </a:ext>
-                  </a:extLst>
-                </a:gridCol>
-                <a:gridCol w="1461014">
-                  <a:extLst>
-                    <a:ext uri="{9D8B030D-6E8A-4147-A177-3AD203B41FA5}">
-                      <a16:colId xmlns:a16="http://schemas.microsoft.com/office/drawing/2014/main" val="2294876602"/>
-                    </a:ext>
-                  </a:extLst>
-                </a:gridCol>
-                <a:gridCol w="1870248">
-                  <a:extLst>
-                    <a:ext uri="{9D8B030D-6E8A-4147-A177-3AD203B41FA5}">
-                      <a16:colId xmlns:a16="http://schemas.microsoft.com/office/drawing/2014/main" val="2195485728"/>
-                    </a:ext>
-                  </a:extLst>
-                </a:gridCol>
-                <a:gridCol w="1378760">
-                  <a:extLst>
-                    <a:ext uri="{9D8B030D-6E8A-4147-A177-3AD203B41FA5}">
-                      <a16:colId xmlns:a16="http://schemas.microsoft.com/office/drawing/2014/main" val="1400196350"/>
-                    </a:ext>
-                  </a:extLst>
-                </a:gridCol>
-              </a:tblGrid>
-              <a:tr h="370840">
-                <a:tc>
-                  <a:txBody>
-                    <a:bodyPr/>
-                    <a:lstStyle/>
-                    <a:p>
-                      <a:pPr algn="ctr"/>
-                      <a:r>
-                        <a:rPr lang="en-US" dirty="0" err="1"/>
-                        <a:t>Match_ID</a:t>
-                      </a:r>
-                      <a:endParaRPr lang="hr-HR" dirty="0"/>
-                    </a:p>
-                  </a:txBody>
-                  <a:tcPr/>
-                </a:tc>
-                <a:tc>
-                  <a:txBody>
-                    <a:bodyPr/>
-                    <a:lstStyle/>
-                    <a:p>
-                      <a:pPr algn="ctr"/>
-                      <a:r>
-                        <a:rPr lang="en-US" dirty="0"/>
-                        <a:t>Date</a:t>
-                      </a:r>
-                      <a:endParaRPr lang="hr-HR" dirty="0"/>
-                    </a:p>
-                  </a:txBody>
-                  <a:tcPr/>
-                </a:tc>
-                <a:tc>
-                  <a:txBody>
-                    <a:bodyPr/>
-                    <a:lstStyle/>
-                    <a:p>
-                      <a:pPr algn="ctr"/>
-                      <a:r>
-                        <a:rPr lang="en-US" dirty="0" err="1"/>
-                        <a:t>Home_</a:t>
-                      </a:r>
-                      <a:r>
-                        <a:rPr lang="en-US" dirty="0" err="1">
-                          <a:solidFill>
-                            <a:srgbClr val="FFC000"/>
-                          </a:solidFill>
-                        </a:rPr>
-                        <a:t>fk</a:t>
-                      </a:r>
-                      <a:endParaRPr lang="hr-HR" dirty="0">
-                        <a:solidFill>
-                          <a:srgbClr val="FFC000"/>
-                        </a:solidFill>
-                      </a:endParaRPr>
-                    </a:p>
-                  </a:txBody>
-                  <a:tcPr/>
-                </a:tc>
-                <a:tc>
-                  <a:txBody>
-                    <a:bodyPr/>
-                    <a:lstStyle/>
-                    <a:p>
-                      <a:pPr algn="ctr"/>
-                      <a:r>
-                        <a:rPr lang="en-US" dirty="0" err="1"/>
-                        <a:t>Away_</a:t>
-                      </a:r>
-                      <a:r>
-                        <a:rPr lang="en-US" dirty="0" err="1">
-                          <a:solidFill>
-                            <a:srgbClr val="FFC000"/>
-                          </a:solidFill>
-                        </a:rPr>
-                        <a:t>fk</a:t>
-                      </a:r>
-                      <a:endParaRPr lang="hr-HR" dirty="0">
-                        <a:solidFill>
-                          <a:srgbClr val="FFC000"/>
-                        </a:solidFill>
-                      </a:endParaRPr>
-                    </a:p>
-                  </a:txBody>
-                  <a:tcPr/>
-                </a:tc>
-                <a:tc>
-                  <a:txBody>
-                    <a:bodyPr/>
-                    <a:lstStyle/>
-                    <a:p>
-                      <a:pPr algn="ctr"/>
-                      <a:r>
-                        <a:rPr lang="en-US" dirty="0" err="1"/>
-                        <a:t>Types_</a:t>
-                      </a:r>
-                      <a:r>
-                        <a:rPr lang="en-US" dirty="0" err="1">
-                          <a:solidFill>
-                            <a:srgbClr val="FF0000"/>
-                          </a:solidFill>
-                        </a:rPr>
-                        <a:t>fk</a:t>
-                      </a:r>
-                      <a:endParaRPr lang="hr-HR" dirty="0">
-                        <a:solidFill>
-                          <a:srgbClr val="FF0000"/>
-                        </a:solidFill>
-                      </a:endParaRPr>
-                    </a:p>
-                  </a:txBody>
-                  <a:tcPr/>
-                </a:tc>
-                <a:extLst>
-                  <a:ext uri="{0D108BD9-81ED-4DB2-BD59-A6C34878D82A}">
-                    <a16:rowId xmlns:a16="http://schemas.microsoft.com/office/drawing/2014/main" val="1946083596"/>
-                  </a:ext>
-                </a:extLst>
-              </a:tr>
-              <a:tr h="370840">
-                <a:tc>
-                  <a:txBody>
-                    <a:bodyPr/>
-                    <a:lstStyle/>
-                    <a:p>
-                      <a:pPr algn="ctr"/>
-                      <a:r>
-                        <a:rPr lang="en-US" dirty="0"/>
-                        <a:t>1</a:t>
-                      </a:r>
-                      <a:endParaRPr lang="hr-HR" dirty="0"/>
-                    </a:p>
-                  </a:txBody>
-                  <a:tcPr/>
-                </a:tc>
-                <a:tc>
-                  <a:txBody>
-                    <a:bodyPr/>
-                    <a:lstStyle/>
-                    <a:p>
-                      <a:pPr algn="ctr"/>
-                      <a:r>
-                        <a:rPr lang="en-US" dirty="0"/>
-                        <a:t>*</a:t>
-                      </a:r>
-                      <a:endParaRPr lang="hr-HR" dirty="0"/>
-                    </a:p>
-                  </a:txBody>
-                  <a:tcPr/>
-                </a:tc>
-                <a:tc>
-                  <a:txBody>
-                    <a:bodyPr/>
-                    <a:lstStyle/>
-                    <a:p>
-                      <a:pPr marL="0" marR="0" lvl="0" indent="0" algn="ctr" defTabSz="914400" rtl="0" eaLnBrk="1" fontAlgn="auto" latinLnBrk="0" hangingPunct="1">
-                        <a:lnSpc>
-                          <a:spcPct val="100000"/>
-                        </a:lnSpc>
-                        <a:spcBef>
-                          <a:spcPts val="0"/>
-                        </a:spcBef>
-                        <a:spcAft>
-                          <a:spcPts val="0"/>
-                        </a:spcAft>
-                        <a:buClrTx/>
-                        <a:buSzTx/>
-                        <a:buFontTx/>
-                        <a:buNone/>
-                        <a:tabLst/>
-                        <a:defRPr/>
-                      </a:pPr>
-                      <a:r>
-                        <a:rPr lang="en-US" dirty="0"/>
-                        <a:t>1</a:t>
-                      </a:r>
-                      <a:endParaRPr lang="hr-HR" dirty="0"/>
-                    </a:p>
-                  </a:txBody>
-                  <a:tcPr/>
-                </a:tc>
-                <a:tc>
-                  <a:txBody>
-                    <a:bodyPr/>
-                    <a:lstStyle/>
-                    <a:p>
-                      <a:pPr marL="0" marR="0" lvl="0" indent="0" algn="ctr" defTabSz="914400" rtl="0" eaLnBrk="1" fontAlgn="auto" latinLnBrk="0" hangingPunct="1">
-                        <a:lnSpc>
-                          <a:spcPct val="100000"/>
-                        </a:lnSpc>
-                        <a:spcBef>
-                          <a:spcPts val="0"/>
-                        </a:spcBef>
-                        <a:spcAft>
-                          <a:spcPts val="0"/>
-                        </a:spcAft>
-                        <a:buClrTx/>
-                        <a:buSzTx/>
-                        <a:buFontTx/>
-                        <a:buNone/>
-                        <a:tabLst/>
-                        <a:defRPr/>
-                      </a:pPr>
-                      <a:r>
-                        <a:rPr lang="en-US" dirty="0"/>
-                        <a:t>2</a:t>
-                      </a:r>
-                      <a:endParaRPr lang="hr-HR" dirty="0"/>
-                    </a:p>
-                  </a:txBody>
-                  <a:tcPr/>
-                </a:tc>
-                <a:tc>
-                  <a:txBody>
-                    <a:bodyPr/>
-                    <a:lstStyle/>
-                    <a:p>
-                      <a:pPr algn="ctr"/>
-                      <a:r>
-                        <a:rPr lang="en-US" dirty="0"/>
-                        <a:t>1</a:t>
-                      </a:r>
-                      <a:endParaRPr lang="hr-HR" dirty="0"/>
-                    </a:p>
-                  </a:txBody>
-                  <a:tcPr/>
-                </a:tc>
-                <a:extLst>
-                  <a:ext uri="{0D108BD9-81ED-4DB2-BD59-A6C34878D82A}">
-                    <a16:rowId xmlns:a16="http://schemas.microsoft.com/office/drawing/2014/main" val="3920316459"/>
-                  </a:ext>
-                </a:extLst>
-              </a:tr>
-              <a:tr h="370840">
-                <a:tc>
-                  <a:txBody>
-                    <a:bodyPr/>
-                    <a:lstStyle/>
-                    <a:p>
-                      <a:pPr algn="ctr"/>
-                      <a:r>
-                        <a:rPr lang="en-US" dirty="0"/>
-                        <a:t>2</a:t>
-                      </a:r>
-                      <a:endParaRPr lang="hr-HR" dirty="0"/>
-                    </a:p>
-                  </a:txBody>
-                  <a:tcPr/>
-                </a:tc>
-                <a:tc>
-                  <a:txBody>
-                    <a:bodyPr/>
-                    <a:lstStyle/>
-                    <a:p>
-                      <a:pPr algn="ctr"/>
-                      <a:r>
-                        <a:rPr lang="en-US" dirty="0"/>
-                        <a:t>*</a:t>
-                      </a:r>
-                      <a:endParaRPr lang="hr-HR" dirty="0"/>
-                    </a:p>
-                  </a:txBody>
-                  <a:tcPr/>
-                </a:tc>
-                <a:tc>
-                  <a:txBody>
-                    <a:bodyPr/>
-                    <a:lstStyle/>
-                    <a:p>
-                      <a:pPr algn="ctr"/>
-                      <a:r>
-                        <a:rPr lang="en-US" dirty="0"/>
-                        <a:t>3</a:t>
-                      </a:r>
-                      <a:endParaRPr lang="hr-HR" dirty="0"/>
-                    </a:p>
-                  </a:txBody>
-                  <a:tcPr/>
-                </a:tc>
-                <a:tc>
-                  <a:txBody>
-                    <a:bodyPr/>
-                    <a:lstStyle/>
-                    <a:p>
-                      <a:pPr marL="0" marR="0" lvl="0" indent="0" algn="ctr" defTabSz="914400" rtl="0" eaLnBrk="1" fontAlgn="auto" latinLnBrk="0" hangingPunct="1">
-                        <a:lnSpc>
-                          <a:spcPct val="100000"/>
-                        </a:lnSpc>
-                        <a:spcBef>
-                          <a:spcPts val="0"/>
-                        </a:spcBef>
-                        <a:spcAft>
-                          <a:spcPts val="0"/>
-                        </a:spcAft>
-                        <a:buClrTx/>
-                        <a:buSzTx/>
-                        <a:buFontTx/>
-                        <a:buNone/>
-                        <a:tabLst/>
-                        <a:defRPr/>
-                      </a:pPr>
-                      <a:r>
-                        <a:rPr lang="en-US" dirty="0"/>
-                        <a:t>4</a:t>
-                      </a:r>
-                      <a:endParaRPr lang="hr-HR" dirty="0"/>
-                    </a:p>
-                  </a:txBody>
-                  <a:tcPr/>
-                </a:tc>
-                <a:tc>
-                  <a:txBody>
-                    <a:bodyPr/>
-                    <a:lstStyle/>
-                    <a:p>
-                      <a:pPr algn="ctr"/>
-                      <a:r>
-                        <a:rPr lang="en-US" dirty="0"/>
-                        <a:t>2</a:t>
-                      </a:r>
-                      <a:endParaRPr lang="hr-HR" dirty="0"/>
-                    </a:p>
-                  </a:txBody>
-                  <a:tcPr/>
-                </a:tc>
-                <a:extLst>
-                  <a:ext uri="{0D108BD9-81ED-4DB2-BD59-A6C34878D82A}">
-                    <a16:rowId xmlns:a16="http://schemas.microsoft.com/office/drawing/2014/main" val="1966806956"/>
-                  </a:ext>
-                </a:extLst>
-              </a:tr>
-              <a:tr h="308141">
-                <a:tc>
-                  <a:txBody>
-                    <a:bodyPr/>
-                    <a:lstStyle/>
-                    <a:p>
-                      <a:pPr algn="ctr"/>
-                      <a:r>
-                        <a:rPr lang="en-US" dirty="0"/>
-                        <a:t>3</a:t>
-                      </a:r>
-                      <a:endParaRPr lang="hr-HR" dirty="0"/>
-                    </a:p>
-                  </a:txBody>
-                  <a:tcPr/>
-                </a:tc>
-                <a:tc>
-                  <a:txBody>
-                    <a:bodyPr/>
-                    <a:lstStyle/>
-                    <a:p>
-                      <a:pPr algn="ctr"/>
-                      <a:r>
-                        <a:rPr lang="en-US" dirty="0"/>
-                        <a:t>*</a:t>
-                      </a:r>
-                      <a:endParaRPr lang="hr-HR" dirty="0"/>
-                    </a:p>
-                  </a:txBody>
-                  <a:tcPr/>
-                </a:tc>
-                <a:tc>
-                  <a:txBody>
-                    <a:bodyPr/>
-                    <a:lstStyle/>
-                    <a:p>
-                      <a:pPr algn="ctr"/>
-                      <a:r>
-                        <a:rPr lang="en-US" dirty="0"/>
-                        <a:t>5</a:t>
-                      </a:r>
-                      <a:endParaRPr lang="hr-HR" dirty="0"/>
-                    </a:p>
-                  </a:txBody>
-                  <a:tcPr/>
-                </a:tc>
-                <a:tc>
-                  <a:txBody>
-                    <a:bodyPr/>
-                    <a:lstStyle/>
-                    <a:p>
-                      <a:pPr marL="0" marR="0" lvl="0" indent="0" algn="ctr" defTabSz="914400" rtl="0" eaLnBrk="1" fontAlgn="auto" latinLnBrk="0" hangingPunct="1">
-                        <a:lnSpc>
-                          <a:spcPct val="100000"/>
-                        </a:lnSpc>
-                        <a:spcBef>
-                          <a:spcPts val="0"/>
-                        </a:spcBef>
-                        <a:spcAft>
-                          <a:spcPts val="0"/>
-                        </a:spcAft>
-                        <a:buClrTx/>
-                        <a:buSzTx/>
-                        <a:buFontTx/>
-                        <a:buNone/>
-                        <a:tabLst/>
-                        <a:defRPr/>
-                      </a:pPr>
-                      <a:r>
-                        <a:rPr lang="en-US" dirty="0"/>
-                        <a:t>6</a:t>
-                      </a:r>
-                      <a:endParaRPr lang="hr-HR" dirty="0"/>
-                    </a:p>
-                  </a:txBody>
-                  <a:tcPr/>
-                </a:tc>
-                <a:tc>
-                  <a:txBody>
-                    <a:bodyPr/>
-                    <a:lstStyle/>
-                    <a:p>
-                      <a:pPr algn="ctr"/>
-                      <a:r>
-                        <a:rPr lang="en-US" dirty="0"/>
-                        <a:t>3</a:t>
-                      </a:r>
-                      <a:endParaRPr lang="hr-HR" dirty="0"/>
-                    </a:p>
-                  </a:txBody>
-                  <a:tcPr/>
-                </a:tc>
-                <a:extLst>
-                  <a:ext uri="{0D108BD9-81ED-4DB2-BD59-A6C34878D82A}">
-                    <a16:rowId xmlns:a16="http://schemas.microsoft.com/office/drawing/2014/main" val="2179751259"/>
-                  </a:ext>
-                </a:extLst>
-              </a:tr>
-              <a:tr h="370840">
-                <a:tc>
-                  <a:txBody>
-                    <a:bodyPr/>
-                    <a:lstStyle/>
-                    <a:p>
-                      <a:pPr algn="ctr"/>
-                      <a:r>
-                        <a:rPr lang="en-US" dirty="0"/>
-                        <a:t>4</a:t>
-                      </a:r>
-                      <a:endParaRPr lang="hr-HR" dirty="0"/>
-                    </a:p>
-                  </a:txBody>
-                  <a:tcPr/>
-                </a:tc>
-                <a:tc>
-                  <a:txBody>
-                    <a:bodyPr/>
-                    <a:lstStyle/>
-                    <a:p>
-                      <a:pPr algn="ctr"/>
-                      <a:r>
-                        <a:rPr lang="en-US" dirty="0"/>
-                        <a:t>*</a:t>
-                      </a:r>
-                      <a:endParaRPr lang="hr-HR" dirty="0"/>
-                    </a:p>
-                  </a:txBody>
-                  <a:tcPr/>
-                </a:tc>
-                <a:tc>
-                  <a:txBody>
-                    <a:bodyPr/>
-                    <a:lstStyle/>
-                    <a:p>
-                      <a:pPr algn="ctr"/>
-                      <a:r>
-                        <a:rPr lang="en-US" dirty="0"/>
-                        <a:t>7</a:t>
-                      </a:r>
-                      <a:endParaRPr lang="hr-HR" dirty="0"/>
-                    </a:p>
-                  </a:txBody>
-                  <a:tcPr/>
-                </a:tc>
-                <a:tc>
-                  <a:txBody>
-                    <a:bodyPr/>
-                    <a:lstStyle/>
-                    <a:p>
-                      <a:pPr marL="0" marR="0" lvl="0" indent="0" algn="ctr" defTabSz="914400" rtl="0" eaLnBrk="1" fontAlgn="auto" latinLnBrk="0" hangingPunct="1">
-                        <a:lnSpc>
-                          <a:spcPct val="100000"/>
-                        </a:lnSpc>
-                        <a:spcBef>
-                          <a:spcPts val="0"/>
-                        </a:spcBef>
-                        <a:spcAft>
-                          <a:spcPts val="0"/>
-                        </a:spcAft>
-                        <a:buClrTx/>
-                        <a:buSzTx/>
-                        <a:buFontTx/>
-                        <a:buNone/>
-                        <a:tabLst/>
-                        <a:defRPr/>
-                      </a:pPr>
-                      <a:r>
-                        <a:rPr lang="en-US" dirty="0"/>
-                        <a:t>8</a:t>
-                      </a:r>
-                      <a:endParaRPr lang="hr-HR" dirty="0"/>
-                    </a:p>
-                  </a:txBody>
-                  <a:tcPr/>
-                </a:tc>
-                <a:tc>
-                  <a:txBody>
-                    <a:bodyPr/>
-                    <a:lstStyle/>
-                    <a:p>
-                      <a:pPr algn="ctr"/>
-                      <a:r>
-                        <a:rPr lang="en-US" dirty="0"/>
-                        <a:t>4</a:t>
-                      </a:r>
-                      <a:endParaRPr lang="hr-HR" dirty="0"/>
-                    </a:p>
-                  </a:txBody>
-                  <a:tcPr/>
-                </a:tc>
-                <a:extLst>
-                  <a:ext uri="{0D108BD9-81ED-4DB2-BD59-A6C34878D82A}">
-                    <a16:rowId xmlns:a16="http://schemas.microsoft.com/office/drawing/2014/main" val="3510268340"/>
-                  </a:ext>
-                </a:extLst>
-              </a:tr>
-              <a:tr h="345080">
-                <a:tc>
-                  <a:txBody>
-                    <a:bodyPr/>
-                    <a:lstStyle/>
-                    <a:p>
-                      <a:pPr algn="ctr"/>
-                      <a:r>
-                        <a:rPr lang="en-US" dirty="0"/>
-                        <a:t>5</a:t>
-                      </a:r>
-                      <a:endParaRPr lang="hr-HR" dirty="0"/>
-                    </a:p>
-                  </a:txBody>
-                  <a:tcPr/>
-                </a:tc>
-                <a:tc>
-                  <a:txBody>
-                    <a:bodyPr/>
-                    <a:lstStyle/>
-                    <a:p>
-                      <a:pPr algn="ctr"/>
-                      <a:r>
-                        <a:rPr lang="en-US" dirty="0"/>
-                        <a:t>*</a:t>
-                      </a:r>
-                      <a:endParaRPr lang="hr-HR" dirty="0"/>
-                    </a:p>
-                  </a:txBody>
-                  <a:tcPr/>
-                </a:tc>
-                <a:tc>
-                  <a:txBody>
-                    <a:bodyPr/>
-                    <a:lstStyle/>
-                    <a:p>
-                      <a:pPr marL="0" marR="0" lvl="0" indent="0" algn="ctr" defTabSz="914400" rtl="0" eaLnBrk="1" fontAlgn="auto" latinLnBrk="0" hangingPunct="1">
-                        <a:lnSpc>
-                          <a:spcPct val="100000"/>
-                        </a:lnSpc>
-                        <a:spcBef>
-                          <a:spcPts val="0"/>
-                        </a:spcBef>
-                        <a:spcAft>
-                          <a:spcPts val="0"/>
-                        </a:spcAft>
-                        <a:buClrTx/>
-                        <a:buSzTx/>
-                        <a:buFontTx/>
-                        <a:buNone/>
-                        <a:tabLst/>
-                        <a:defRPr/>
-                      </a:pPr>
-                      <a:r>
-                        <a:rPr lang="en-US" dirty="0"/>
-                        <a:t>9</a:t>
-                      </a:r>
-                      <a:endParaRPr lang="hr-HR" dirty="0"/>
-                    </a:p>
-                  </a:txBody>
-                  <a:tcPr/>
-                </a:tc>
-                <a:tc>
-                  <a:txBody>
-                    <a:bodyPr/>
-                    <a:lstStyle/>
-                    <a:p>
-                      <a:pPr marL="0" marR="0" lvl="0" indent="0" algn="ctr" defTabSz="914400" rtl="0" eaLnBrk="1" fontAlgn="auto" latinLnBrk="0" hangingPunct="1">
-                        <a:lnSpc>
-                          <a:spcPct val="100000"/>
-                        </a:lnSpc>
-                        <a:spcBef>
-                          <a:spcPts val="0"/>
-                        </a:spcBef>
-                        <a:spcAft>
-                          <a:spcPts val="0"/>
-                        </a:spcAft>
-                        <a:buClrTx/>
-                        <a:buSzTx/>
-                        <a:buFontTx/>
-                        <a:buNone/>
-                        <a:tabLst/>
-                        <a:defRPr/>
-                      </a:pPr>
-                      <a:r>
-                        <a:rPr lang="en-US" dirty="0"/>
-                        <a:t>10</a:t>
-                      </a:r>
-                      <a:endParaRPr lang="hr-HR" dirty="0"/>
-                    </a:p>
-                  </a:txBody>
-                  <a:tcPr/>
-                </a:tc>
-                <a:tc>
-                  <a:txBody>
-                    <a:bodyPr/>
-                    <a:lstStyle/>
-                    <a:p>
-                      <a:pPr algn="ctr"/>
-                      <a:r>
-                        <a:rPr lang="en-US" dirty="0"/>
-                        <a:t>5</a:t>
-                      </a:r>
-                      <a:endParaRPr lang="hr-HR" dirty="0"/>
-                    </a:p>
-                  </a:txBody>
-                  <a:tcPr/>
-                </a:tc>
-                <a:extLst>
-                  <a:ext uri="{0D108BD9-81ED-4DB2-BD59-A6C34878D82A}">
-                    <a16:rowId xmlns:a16="http://schemas.microsoft.com/office/drawing/2014/main" val="3501477304"/>
-                  </a:ext>
-                </a:extLst>
-              </a:tr>
-            </a:tbl>
-          </a:graphicData>
-        </a:graphic>
-      </p:graphicFrame>
-    </p:spTree>
-    <p:extLst>
-      <p:ext uri="{BB962C8B-B14F-4D97-AF65-F5344CB8AC3E}">
-        <p14:creationId xmlns:p14="http://schemas.microsoft.com/office/powerpoint/2010/main" val="2238036066"/>
-      </p:ext>
-    </p:extLst>
-  </p:cSld>
-  <p:clrMapOvr>
-    <a:masterClrMapping/>
-  </p:clrMapOvr>
-</p:sld>
-</file>
-
-<file path=ppt/slides/slide7.xml><?xml version="1.0" encoding="utf-8"?>
 <p:sld xmlns:a="http://schemas.openxmlformats.org/drawingml/2006/main" xmlns:r="http://schemas.openxmlformats.org/officeDocument/2006/relationships" xmlns:p="http://schemas.openxmlformats.org/presentationml/2006/main">
   <p:cSld>
     <p:spTree>
@@ -8735,7 +8324,7 @@
         </p:nvSpPr>
         <p:spPr>
           <a:xfrm>
-            <a:off x="605482" y="5832389"/>
+            <a:off x="698247" y="5832388"/>
             <a:ext cx="3632886" cy="369332"/>
           </a:xfrm>
           <a:prstGeom prst="rect">
@@ -8773,7 +8362,7 @@
         </p:nvCxnSpPr>
         <p:spPr>
           <a:xfrm flipV="1">
-            <a:off x="2261287" y="5299905"/>
+            <a:off x="2354052" y="5299904"/>
             <a:ext cx="0" cy="532484"/>
           </a:xfrm>
           <a:prstGeom prst="straightConnector1">
@@ -8802,6 +8391,797 @@
     <p:extLst>
       <p:ext uri="{BB962C8B-B14F-4D97-AF65-F5344CB8AC3E}">
         <p14:creationId xmlns:p14="http://schemas.microsoft.com/office/powerpoint/2010/main" val="591953886"/>
+      </p:ext>
+    </p:extLst>
+  </p:cSld>
+  <p:clrMapOvr>
+    <a:masterClrMapping/>
+  </p:clrMapOvr>
+</p:sld>
+</file>
+
+<file path=ppt/slides/slide7.xml><?xml version="1.0" encoding="utf-8"?>
+<p:sld xmlns:a="http://schemas.openxmlformats.org/drawingml/2006/main" xmlns:r="http://schemas.openxmlformats.org/officeDocument/2006/relationships" xmlns:p="http://schemas.openxmlformats.org/presentationml/2006/main">
+  <p:cSld>
+    <p:spTree>
+      <p:nvGrpSpPr>
+        <p:cNvPr id="1" name=""/>
+        <p:cNvGrpSpPr/>
+        <p:nvPr/>
+      </p:nvGrpSpPr>
+      <p:grpSpPr>
+        <a:xfrm>
+          <a:off x="0" y="0"/>
+          <a:ext cx="0" cy="0"/>
+          <a:chOff x="0" y="0"/>
+          <a:chExt cx="0" cy="0"/>
+        </a:xfrm>
+      </p:grpSpPr>
+      <p:sp>
+        <p:nvSpPr>
+          <p:cNvPr id="4" name="Rectangle 3">
+            <a:extLst>
+              <a:ext uri="{FF2B5EF4-FFF2-40B4-BE49-F238E27FC236}">
+                <a16:creationId xmlns:a16="http://schemas.microsoft.com/office/drawing/2014/main" id="{1E9DCB2C-BC60-40EF-A76B-C116E74B2D55}"/>
+              </a:ext>
+            </a:extLst>
+          </p:cNvPr>
+          <p:cNvSpPr/>
+          <p:nvPr/>
+        </p:nvSpPr>
+        <p:spPr>
+          <a:xfrm>
+            <a:off x="605482" y="313036"/>
+            <a:ext cx="2743200" cy="1062681"/>
+          </a:xfrm>
+          <a:prstGeom prst="rect">
+            <a:avLst/>
+          </a:prstGeom>
+        </p:spPr>
+        <p:style>
+          <a:lnRef idx="2">
+            <a:schemeClr val="accent1">
+              <a:shade val="50000"/>
+            </a:schemeClr>
+          </a:lnRef>
+          <a:fillRef idx="1">
+            <a:schemeClr val="accent1"/>
+          </a:fillRef>
+          <a:effectRef idx="0">
+            <a:schemeClr val="accent1"/>
+          </a:effectRef>
+          <a:fontRef idx="minor">
+            <a:schemeClr val="lt1"/>
+          </a:fontRef>
+        </p:style>
+        <p:txBody>
+          <a:bodyPr rtlCol="0" anchor="ctr"/>
+          <a:lstStyle/>
+          <a:p>
+            <a:pPr algn="ctr"/>
+            <a:r>
+              <a:rPr lang="en-US" dirty="0"/>
+              <a:t>Match</a:t>
+            </a:r>
+            <a:endParaRPr lang="hr-HR" dirty="0"/>
+          </a:p>
+        </p:txBody>
+      </p:sp>
+      <p:graphicFrame>
+        <p:nvGraphicFramePr>
+          <p:cNvPr id="2" name="Table 2">
+            <a:extLst>
+              <a:ext uri="{FF2B5EF4-FFF2-40B4-BE49-F238E27FC236}">
+                <a16:creationId xmlns:a16="http://schemas.microsoft.com/office/drawing/2014/main" id="{16FCD44F-8466-477E-BD23-48CA7ED90A43}"/>
+              </a:ext>
+            </a:extLst>
+          </p:cNvPr>
+          <p:cNvGraphicFramePr>
+            <a:graphicFrameLocks noGrp="1"/>
+          </p:cNvGraphicFramePr>
+          <p:nvPr>
+            <p:extLst>
+              <p:ext uri="{D42A27DB-BD31-4B8C-83A1-F6EECF244321}">
+                <p14:modId xmlns:p14="http://schemas.microsoft.com/office/powerpoint/2010/main" val="1098985385"/>
+              </p:ext>
+            </p:extLst>
+          </p:nvPr>
+        </p:nvGraphicFramePr>
+        <p:xfrm>
+          <a:off x="189470" y="2709104"/>
+          <a:ext cx="7298009" cy="2214880"/>
+        </p:xfrm>
+        <a:graphic>
+          <a:graphicData uri="http://schemas.openxmlformats.org/drawingml/2006/table">
+            <a:tbl>
+              <a:tblPr firstRow="1" bandRow="1">
+                <a:tableStyleId>{5C22544A-7EE6-4342-B048-85BDC9FD1C3A}</a:tableStyleId>
+              </a:tblPr>
+              <a:tblGrid>
+                <a:gridCol w="1126973">
+                  <a:extLst>
+                    <a:ext uri="{9D8B030D-6E8A-4147-A177-3AD203B41FA5}">
+                      <a16:colId xmlns:a16="http://schemas.microsoft.com/office/drawing/2014/main" val="3459061120"/>
+                    </a:ext>
+                  </a:extLst>
+                </a:gridCol>
+                <a:gridCol w="1461014">
+                  <a:extLst>
+                    <a:ext uri="{9D8B030D-6E8A-4147-A177-3AD203B41FA5}">
+                      <a16:colId xmlns:a16="http://schemas.microsoft.com/office/drawing/2014/main" val="3556585"/>
+                    </a:ext>
+                  </a:extLst>
+                </a:gridCol>
+                <a:gridCol w="1461014">
+                  <a:extLst>
+                    <a:ext uri="{9D8B030D-6E8A-4147-A177-3AD203B41FA5}">
+                      <a16:colId xmlns:a16="http://schemas.microsoft.com/office/drawing/2014/main" val="2294876602"/>
+                    </a:ext>
+                  </a:extLst>
+                </a:gridCol>
+                <a:gridCol w="1870248">
+                  <a:extLst>
+                    <a:ext uri="{9D8B030D-6E8A-4147-A177-3AD203B41FA5}">
+                      <a16:colId xmlns:a16="http://schemas.microsoft.com/office/drawing/2014/main" val="2195485728"/>
+                    </a:ext>
+                  </a:extLst>
+                </a:gridCol>
+                <a:gridCol w="1378760">
+                  <a:extLst>
+                    <a:ext uri="{9D8B030D-6E8A-4147-A177-3AD203B41FA5}">
+                      <a16:colId xmlns:a16="http://schemas.microsoft.com/office/drawing/2014/main" val="1400196350"/>
+                    </a:ext>
+                  </a:extLst>
+                </a:gridCol>
+              </a:tblGrid>
+              <a:tr h="370840">
+                <a:tc>
+                  <a:txBody>
+                    <a:bodyPr/>
+                    <a:lstStyle/>
+                    <a:p>
+                      <a:pPr algn="ctr"/>
+                      <a:r>
+                        <a:rPr lang="en-US" dirty="0" err="1"/>
+                        <a:t>Match_ID</a:t>
+                      </a:r>
+                      <a:endParaRPr lang="hr-HR" dirty="0"/>
+                    </a:p>
+                  </a:txBody>
+                  <a:tcPr/>
+                </a:tc>
+                <a:tc>
+                  <a:txBody>
+                    <a:bodyPr/>
+                    <a:lstStyle/>
+                    <a:p>
+                      <a:pPr algn="ctr"/>
+                      <a:r>
+                        <a:rPr lang="en-US" dirty="0"/>
+                        <a:t>Date</a:t>
+                      </a:r>
+                      <a:endParaRPr lang="hr-HR" dirty="0"/>
+                    </a:p>
+                  </a:txBody>
+                  <a:tcPr/>
+                </a:tc>
+                <a:tc>
+                  <a:txBody>
+                    <a:bodyPr/>
+                    <a:lstStyle/>
+                    <a:p>
+                      <a:pPr algn="ctr"/>
+                      <a:r>
+                        <a:rPr lang="en-US" dirty="0" err="1"/>
+                        <a:t>Home_</a:t>
+                      </a:r>
+                      <a:r>
+                        <a:rPr lang="en-US" dirty="0" err="1">
+                          <a:solidFill>
+                            <a:srgbClr val="FFC000"/>
+                          </a:solidFill>
+                        </a:rPr>
+                        <a:t>fk</a:t>
+                      </a:r>
+                      <a:endParaRPr lang="hr-HR" dirty="0">
+                        <a:solidFill>
+                          <a:srgbClr val="FFC000"/>
+                        </a:solidFill>
+                      </a:endParaRPr>
+                    </a:p>
+                  </a:txBody>
+                  <a:tcPr/>
+                </a:tc>
+                <a:tc>
+                  <a:txBody>
+                    <a:bodyPr/>
+                    <a:lstStyle/>
+                    <a:p>
+                      <a:pPr algn="ctr"/>
+                      <a:r>
+                        <a:rPr lang="en-US" dirty="0" err="1"/>
+                        <a:t>Away_</a:t>
+                      </a:r>
+                      <a:r>
+                        <a:rPr lang="en-US" dirty="0" err="1">
+                          <a:solidFill>
+                            <a:srgbClr val="FFC000"/>
+                          </a:solidFill>
+                        </a:rPr>
+                        <a:t>fk</a:t>
+                      </a:r>
+                      <a:endParaRPr lang="hr-HR" dirty="0">
+                        <a:solidFill>
+                          <a:srgbClr val="FFC000"/>
+                        </a:solidFill>
+                      </a:endParaRPr>
+                    </a:p>
+                  </a:txBody>
+                  <a:tcPr/>
+                </a:tc>
+                <a:tc>
+                  <a:txBody>
+                    <a:bodyPr/>
+                    <a:lstStyle/>
+                    <a:p>
+                      <a:pPr algn="ctr"/>
+                      <a:r>
+                        <a:rPr lang="en-US" dirty="0" err="1"/>
+                        <a:t>Types_</a:t>
+                      </a:r>
+                      <a:r>
+                        <a:rPr lang="en-US" dirty="0" err="1">
+                          <a:solidFill>
+                            <a:srgbClr val="FF0000"/>
+                          </a:solidFill>
+                        </a:rPr>
+                        <a:t>fk</a:t>
+                      </a:r>
+                      <a:endParaRPr lang="hr-HR" dirty="0">
+                        <a:solidFill>
+                          <a:srgbClr val="FF0000"/>
+                        </a:solidFill>
+                      </a:endParaRPr>
+                    </a:p>
+                  </a:txBody>
+                  <a:tcPr/>
+                </a:tc>
+                <a:extLst>
+                  <a:ext uri="{0D108BD9-81ED-4DB2-BD59-A6C34878D82A}">
+                    <a16:rowId xmlns:a16="http://schemas.microsoft.com/office/drawing/2014/main" val="1946083596"/>
+                  </a:ext>
+                </a:extLst>
+              </a:tr>
+              <a:tr h="370840">
+                <a:tc>
+                  <a:txBody>
+                    <a:bodyPr/>
+                    <a:lstStyle/>
+                    <a:p>
+                      <a:pPr algn="ctr"/>
+                      <a:r>
+                        <a:rPr lang="en-US" dirty="0"/>
+                        <a:t>1</a:t>
+                      </a:r>
+                      <a:endParaRPr lang="hr-HR" dirty="0"/>
+                    </a:p>
+                  </a:txBody>
+                  <a:tcPr/>
+                </a:tc>
+                <a:tc>
+                  <a:txBody>
+                    <a:bodyPr/>
+                    <a:lstStyle/>
+                    <a:p>
+                      <a:pPr algn="ctr"/>
+                      <a:r>
+                        <a:rPr lang="en-US" dirty="0"/>
+                        <a:t>*</a:t>
+                      </a:r>
+                      <a:endParaRPr lang="hr-HR" dirty="0"/>
+                    </a:p>
+                  </a:txBody>
+                  <a:tcPr/>
+                </a:tc>
+                <a:tc>
+                  <a:txBody>
+                    <a:bodyPr/>
+                    <a:lstStyle/>
+                    <a:p>
+                      <a:pPr marL="0" marR="0" lvl="0" indent="0" algn="ctr" defTabSz="914400" rtl="0" eaLnBrk="1" fontAlgn="auto" latinLnBrk="0" hangingPunct="1">
+                        <a:lnSpc>
+                          <a:spcPct val="100000"/>
+                        </a:lnSpc>
+                        <a:spcBef>
+                          <a:spcPts val="0"/>
+                        </a:spcBef>
+                        <a:spcAft>
+                          <a:spcPts val="0"/>
+                        </a:spcAft>
+                        <a:buClrTx/>
+                        <a:buSzTx/>
+                        <a:buFontTx/>
+                        <a:buNone/>
+                        <a:tabLst/>
+                        <a:defRPr/>
+                      </a:pPr>
+                      <a:r>
+                        <a:rPr lang="en-US" dirty="0"/>
+                        <a:t>1</a:t>
+                      </a:r>
+                      <a:endParaRPr lang="hr-HR" dirty="0"/>
+                    </a:p>
+                  </a:txBody>
+                  <a:tcPr/>
+                </a:tc>
+                <a:tc>
+                  <a:txBody>
+                    <a:bodyPr/>
+                    <a:lstStyle/>
+                    <a:p>
+                      <a:pPr marL="0" marR="0" lvl="0" indent="0" algn="ctr" defTabSz="914400" rtl="0" eaLnBrk="1" fontAlgn="auto" latinLnBrk="0" hangingPunct="1">
+                        <a:lnSpc>
+                          <a:spcPct val="100000"/>
+                        </a:lnSpc>
+                        <a:spcBef>
+                          <a:spcPts val="0"/>
+                        </a:spcBef>
+                        <a:spcAft>
+                          <a:spcPts val="0"/>
+                        </a:spcAft>
+                        <a:buClrTx/>
+                        <a:buSzTx/>
+                        <a:buFontTx/>
+                        <a:buNone/>
+                        <a:tabLst/>
+                        <a:defRPr/>
+                      </a:pPr>
+                      <a:r>
+                        <a:rPr lang="en-US" dirty="0"/>
+                        <a:t>2</a:t>
+                      </a:r>
+                      <a:endParaRPr lang="hr-HR" dirty="0"/>
+                    </a:p>
+                  </a:txBody>
+                  <a:tcPr/>
+                </a:tc>
+                <a:tc>
+                  <a:txBody>
+                    <a:bodyPr/>
+                    <a:lstStyle/>
+                    <a:p>
+                      <a:pPr algn="ctr"/>
+                      <a:r>
+                        <a:rPr lang="en-US" dirty="0"/>
+                        <a:t>1</a:t>
+                      </a:r>
+                      <a:endParaRPr lang="hr-HR" dirty="0"/>
+                    </a:p>
+                  </a:txBody>
+                  <a:tcPr/>
+                </a:tc>
+                <a:extLst>
+                  <a:ext uri="{0D108BD9-81ED-4DB2-BD59-A6C34878D82A}">
+                    <a16:rowId xmlns:a16="http://schemas.microsoft.com/office/drawing/2014/main" val="3920316459"/>
+                  </a:ext>
+                </a:extLst>
+              </a:tr>
+              <a:tr h="370840">
+                <a:tc>
+                  <a:txBody>
+                    <a:bodyPr/>
+                    <a:lstStyle/>
+                    <a:p>
+                      <a:pPr algn="ctr"/>
+                      <a:r>
+                        <a:rPr lang="en-US" dirty="0"/>
+                        <a:t>2</a:t>
+                      </a:r>
+                      <a:endParaRPr lang="hr-HR" dirty="0"/>
+                    </a:p>
+                  </a:txBody>
+                  <a:tcPr/>
+                </a:tc>
+                <a:tc>
+                  <a:txBody>
+                    <a:bodyPr/>
+                    <a:lstStyle/>
+                    <a:p>
+                      <a:pPr algn="ctr"/>
+                      <a:r>
+                        <a:rPr lang="en-US" dirty="0"/>
+                        <a:t>*</a:t>
+                      </a:r>
+                      <a:endParaRPr lang="hr-HR" dirty="0"/>
+                    </a:p>
+                  </a:txBody>
+                  <a:tcPr/>
+                </a:tc>
+                <a:tc>
+                  <a:txBody>
+                    <a:bodyPr/>
+                    <a:lstStyle/>
+                    <a:p>
+                      <a:pPr algn="ctr"/>
+                      <a:r>
+                        <a:rPr lang="en-US" dirty="0"/>
+                        <a:t>3</a:t>
+                      </a:r>
+                      <a:endParaRPr lang="hr-HR" dirty="0"/>
+                    </a:p>
+                  </a:txBody>
+                  <a:tcPr/>
+                </a:tc>
+                <a:tc>
+                  <a:txBody>
+                    <a:bodyPr/>
+                    <a:lstStyle/>
+                    <a:p>
+                      <a:pPr marL="0" marR="0" lvl="0" indent="0" algn="ctr" defTabSz="914400" rtl="0" eaLnBrk="1" fontAlgn="auto" latinLnBrk="0" hangingPunct="1">
+                        <a:lnSpc>
+                          <a:spcPct val="100000"/>
+                        </a:lnSpc>
+                        <a:spcBef>
+                          <a:spcPts val="0"/>
+                        </a:spcBef>
+                        <a:spcAft>
+                          <a:spcPts val="0"/>
+                        </a:spcAft>
+                        <a:buClrTx/>
+                        <a:buSzTx/>
+                        <a:buFontTx/>
+                        <a:buNone/>
+                        <a:tabLst/>
+                        <a:defRPr/>
+                      </a:pPr>
+                      <a:r>
+                        <a:rPr lang="en-US" dirty="0"/>
+                        <a:t>4</a:t>
+                      </a:r>
+                      <a:endParaRPr lang="hr-HR" dirty="0"/>
+                    </a:p>
+                  </a:txBody>
+                  <a:tcPr/>
+                </a:tc>
+                <a:tc>
+                  <a:txBody>
+                    <a:bodyPr/>
+                    <a:lstStyle/>
+                    <a:p>
+                      <a:pPr algn="ctr"/>
+                      <a:r>
+                        <a:rPr lang="en-US" dirty="0"/>
+                        <a:t>2</a:t>
+                      </a:r>
+                      <a:endParaRPr lang="hr-HR" dirty="0"/>
+                    </a:p>
+                  </a:txBody>
+                  <a:tcPr/>
+                </a:tc>
+                <a:extLst>
+                  <a:ext uri="{0D108BD9-81ED-4DB2-BD59-A6C34878D82A}">
+                    <a16:rowId xmlns:a16="http://schemas.microsoft.com/office/drawing/2014/main" val="1966806956"/>
+                  </a:ext>
+                </a:extLst>
+              </a:tr>
+              <a:tr h="308141">
+                <a:tc>
+                  <a:txBody>
+                    <a:bodyPr/>
+                    <a:lstStyle/>
+                    <a:p>
+                      <a:pPr algn="ctr"/>
+                      <a:r>
+                        <a:rPr lang="en-US" dirty="0"/>
+                        <a:t>3</a:t>
+                      </a:r>
+                      <a:endParaRPr lang="hr-HR" dirty="0"/>
+                    </a:p>
+                  </a:txBody>
+                  <a:tcPr/>
+                </a:tc>
+                <a:tc>
+                  <a:txBody>
+                    <a:bodyPr/>
+                    <a:lstStyle/>
+                    <a:p>
+                      <a:pPr algn="ctr"/>
+                      <a:r>
+                        <a:rPr lang="en-US" dirty="0"/>
+                        <a:t>*</a:t>
+                      </a:r>
+                      <a:endParaRPr lang="hr-HR" dirty="0"/>
+                    </a:p>
+                  </a:txBody>
+                  <a:tcPr/>
+                </a:tc>
+                <a:tc>
+                  <a:txBody>
+                    <a:bodyPr/>
+                    <a:lstStyle/>
+                    <a:p>
+                      <a:pPr algn="ctr"/>
+                      <a:r>
+                        <a:rPr lang="en-US" dirty="0"/>
+                        <a:t>5</a:t>
+                      </a:r>
+                      <a:endParaRPr lang="hr-HR" dirty="0"/>
+                    </a:p>
+                  </a:txBody>
+                  <a:tcPr/>
+                </a:tc>
+                <a:tc>
+                  <a:txBody>
+                    <a:bodyPr/>
+                    <a:lstStyle/>
+                    <a:p>
+                      <a:pPr marL="0" marR="0" lvl="0" indent="0" algn="ctr" defTabSz="914400" rtl="0" eaLnBrk="1" fontAlgn="auto" latinLnBrk="0" hangingPunct="1">
+                        <a:lnSpc>
+                          <a:spcPct val="100000"/>
+                        </a:lnSpc>
+                        <a:spcBef>
+                          <a:spcPts val="0"/>
+                        </a:spcBef>
+                        <a:spcAft>
+                          <a:spcPts val="0"/>
+                        </a:spcAft>
+                        <a:buClrTx/>
+                        <a:buSzTx/>
+                        <a:buFontTx/>
+                        <a:buNone/>
+                        <a:tabLst/>
+                        <a:defRPr/>
+                      </a:pPr>
+                      <a:r>
+                        <a:rPr lang="en-US" dirty="0"/>
+                        <a:t>6</a:t>
+                      </a:r>
+                      <a:endParaRPr lang="hr-HR" dirty="0"/>
+                    </a:p>
+                  </a:txBody>
+                  <a:tcPr/>
+                </a:tc>
+                <a:tc>
+                  <a:txBody>
+                    <a:bodyPr/>
+                    <a:lstStyle/>
+                    <a:p>
+                      <a:pPr algn="ctr"/>
+                      <a:r>
+                        <a:rPr lang="en-US" dirty="0"/>
+                        <a:t>3</a:t>
+                      </a:r>
+                      <a:endParaRPr lang="hr-HR" dirty="0"/>
+                    </a:p>
+                  </a:txBody>
+                  <a:tcPr/>
+                </a:tc>
+                <a:extLst>
+                  <a:ext uri="{0D108BD9-81ED-4DB2-BD59-A6C34878D82A}">
+                    <a16:rowId xmlns:a16="http://schemas.microsoft.com/office/drawing/2014/main" val="2179751259"/>
+                  </a:ext>
+                </a:extLst>
+              </a:tr>
+              <a:tr h="370840">
+                <a:tc>
+                  <a:txBody>
+                    <a:bodyPr/>
+                    <a:lstStyle/>
+                    <a:p>
+                      <a:pPr algn="ctr"/>
+                      <a:r>
+                        <a:rPr lang="en-US" dirty="0"/>
+                        <a:t>4</a:t>
+                      </a:r>
+                      <a:endParaRPr lang="hr-HR" dirty="0"/>
+                    </a:p>
+                  </a:txBody>
+                  <a:tcPr/>
+                </a:tc>
+                <a:tc>
+                  <a:txBody>
+                    <a:bodyPr/>
+                    <a:lstStyle/>
+                    <a:p>
+                      <a:pPr algn="ctr"/>
+                      <a:r>
+                        <a:rPr lang="en-US" dirty="0"/>
+                        <a:t>*</a:t>
+                      </a:r>
+                      <a:endParaRPr lang="hr-HR" dirty="0"/>
+                    </a:p>
+                  </a:txBody>
+                  <a:tcPr/>
+                </a:tc>
+                <a:tc>
+                  <a:txBody>
+                    <a:bodyPr/>
+                    <a:lstStyle/>
+                    <a:p>
+                      <a:pPr algn="ctr"/>
+                      <a:r>
+                        <a:rPr lang="en-US" dirty="0"/>
+                        <a:t>7</a:t>
+                      </a:r>
+                      <a:endParaRPr lang="hr-HR" dirty="0"/>
+                    </a:p>
+                  </a:txBody>
+                  <a:tcPr/>
+                </a:tc>
+                <a:tc>
+                  <a:txBody>
+                    <a:bodyPr/>
+                    <a:lstStyle/>
+                    <a:p>
+                      <a:pPr marL="0" marR="0" lvl="0" indent="0" algn="ctr" defTabSz="914400" rtl="0" eaLnBrk="1" fontAlgn="auto" latinLnBrk="0" hangingPunct="1">
+                        <a:lnSpc>
+                          <a:spcPct val="100000"/>
+                        </a:lnSpc>
+                        <a:spcBef>
+                          <a:spcPts val="0"/>
+                        </a:spcBef>
+                        <a:spcAft>
+                          <a:spcPts val="0"/>
+                        </a:spcAft>
+                        <a:buClrTx/>
+                        <a:buSzTx/>
+                        <a:buFontTx/>
+                        <a:buNone/>
+                        <a:tabLst/>
+                        <a:defRPr/>
+                      </a:pPr>
+                      <a:r>
+                        <a:rPr lang="en-US" dirty="0"/>
+                        <a:t>8</a:t>
+                      </a:r>
+                      <a:endParaRPr lang="hr-HR" dirty="0"/>
+                    </a:p>
+                  </a:txBody>
+                  <a:tcPr/>
+                </a:tc>
+                <a:tc>
+                  <a:txBody>
+                    <a:bodyPr/>
+                    <a:lstStyle/>
+                    <a:p>
+                      <a:pPr algn="ctr"/>
+                      <a:r>
+                        <a:rPr lang="en-US" dirty="0"/>
+                        <a:t>4</a:t>
+                      </a:r>
+                      <a:endParaRPr lang="hr-HR" dirty="0"/>
+                    </a:p>
+                  </a:txBody>
+                  <a:tcPr/>
+                </a:tc>
+                <a:extLst>
+                  <a:ext uri="{0D108BD9-81ED-4DB2-BD59-A6C34878D82A}">
+                    <a16:rowId xmlns:a16="http://schemas.microsoft.com/office/drawing/2014/main" val="3510268340"/>
+                  </a:ext>
+                </a:extLst>
+              </a:tr>
+              <a:tr h="345080">
+                <a:tc>
+                  <a:txBody>
+                    <a:bodyPr/>
+                    <a:lstStyle/>
+                    <a:p>
+                      <a:pPr algn="ctr"/>
+                      <a:r>
+                        <a:rPr lang="en-US" dirty="0"/>
+                        <a:t>5</a:t>
+                      </a:r>
+                      <a:endParaRPr lang="hr-HR" dirty="0"/>
+                    </a:p>
+                  </a:txBody>
+                  <a:tcPr/>
+                </a:tc>
+                <a:tc>
+                  <a:txBody>
+                    <a:bodyPr/>
+                    <a:lstStyle/>
+                    <a:p>
+                      <a:pPr algn="ctr"/>
+                      <a:r>
+                        <a:rPr lang="en-US" dirty="0"/>
+                        <a:t>*</a:t>
+                      </a:r>
+                      <a:endParaRPr lang="hr-HR" dirty="0"/>
+                    </a:p>
+                  </a:txBody>
+                  <a:tcPr/>
+                </a:tc>
+                <a:tc>
+                  <a:txBody>
+                    <a:bodyPr/>
+                    <a:lstStyle/>
+                    <a:p>
+                      <a:pPr marL="0" marR="0" lvl="0" indent="0" algn="ctr" defTabSz="914400" rtl="0" eaLnBrk="1" fontAlgn="auto" latinLnBrk="0" hangingPunct="1">
+                        <a:lnSpc>
+                          <a:spcPct val="100000"/>
+                        </a:lnSpc>
+                        <a:spcBef>
+                          <a:spcPts val="0"/>
+                        </a:spcBef>
+                        <a:spcAft>
+                          <a:spcPts val="0"/>
+                        </a:spcAft>
+                        <a:buClrTx/>
+                        <a:buSzTx/>
+                        <a:buFontTx/>
+                        <a:buNone/>
+                        <a:tabLst/>
+                        <a:defRPr/>
+                      </a:pPr>
+                      <a:r>
+                        <a:rPr lang="en-US" dirty="0"/>
+                        <a:t>9</a:t>
+                      </a:r>
+                      <a:endParaRPr lang="hr-HR" dirty="0"/>
+                    </a:p>
+                  </a:txBody>
+                  <a:tcPr/>
+                </a:tc>
+                <a:tc>
+                  <a:txBody>
+                    <a:bodyPr/>
+                    <a:lstStyle/>
+                    <a:p>
+                      <a:pPr marL="0" marR="0" lvl="0" indent="0" algn="ctr" defTabSz="914400" rtl="0" eaLnBrk="1" fontAlgn="auto" latinLnBrk="0" hangingPunct="1">
+                        <a:lnSpc>
+                          <a:spcPct val="100000"/>
+                        </a:lnSpc>
+                        <a:spcBef>
+                          <a:spcPts val="0"/>
+                        </a:spcBef>
+                        <a:spcAft>
+                          <a:spcPts val="0"/>
+                        </a:spcAft>
+                        <a:buClrTx/>
+                        <a:buSzTx/>
+                        <a:buFontTx/>
+                        <a:buNone/>
+                        <a:tabLst/>
+                        <a:defRPr/>
+                      </a:pPr>
+                      <a:r>
+                        <a:rPr lang="en-US" dirty="0"/>
+                        <a:t>10</a:t>
+                      </a:r>
+                      <a:endParaRPr lang="hr-HR" dirty="0"/>
+                    </a:p>
+                  </a:txBody>
+                  <a:tcPr/>
+                </a:tc>
+                <a:tc>
+                  <a:txBody>
+                    <a:bodyPr/>
+                    <a:lstStyle/>
+                    <a:p>
+                      <a:pPr algn="ctr"/>
+                      <a:r>
+                        <a:rPr lang="en-US" dirty="0"/>
+                        <a:t>5</a:t>
+                      </a:r>
+                      <a:endParaRPr lang="hr-HR" dirty="0"/>
+                    </a:p>
+                  </a:txBody>
+                  <a:tcPr/>
+                </a:tc>
+                <a:extLst>
+                  <a:ext uri="{0D108BD9-81ED-4DB2-BD59-A6C34878D82A}">
+                    <a16:rowId xmlns:a16="http://schemas.microsoft.com/office/drawing/2014/main" val="3501477304"/>
+                  </a:ext>
+                </a:extLst>
+              </a:tr>
+            </a:tbl>
+          </a:graphicData>
+        </a:graphic>
+      </p:graphicFrame>
+    </p:spTree>
+    <p:extLst>
+      <p:ext uri="{BB962C8B-B14F-4D97-AF65-F5344CB8AC3E}">
+        <p14:creationId xmlns:p14="http://schemas.microsoft.com/office/powerpoint/2010/main" val="2238036066"/>
       </p:ext>
     </p:extLst>
   </p:cSld>
@@ -8893,14 +9273,14 @@
           <p:nvPr>
             <p:extLst>
               <p:ext uri="{D42A27DB-BD31-4B8C-83A1-F6EECF244321}">
-                <p14:modId xmlns:p14="http://schemas.microsoft.com/office/powerpoint/2010/main" val="216258722"/>
+                <p14:modId xmlns:p14="http://schemas.microsoft.com/office/powerpoint/2010/main" val="367809075"/>
               </p:ext>
             </p:extLst>
           </p:nvPr>
         </p:nvGraphicFramePr>
         <p:xfrm>
           <a:off x="605482" y="1708207"/>
-          <a:ext cx="6783858" cy="4348480"/>
+          <a:ext cx="6783858" cy="4079240"/>
         </p:xfrm>
         <a:graphic>
           <a:graphicData uri="http://schemas.openxmlformats.org/drawingml/2006/table">
@@ -9025,10 +9405,6 @@
                         <a:rPr lang="en-US" dirty="0"/>
                         <a:t>FC Barcelona</a:t>
                       </a:r>
-                      <a:endParaRPr lang="hr-HR" dirty="0"/>
-                    </a:p>
-                    <a:p>
-                      <a:pPr algn="ctr"/>
                       <a:endParaRPr lang="hr-HR" dirty="0"/>
                     </a:p>
                   </a:txBody>

</xml_diff>

<commit_message>
Removed Table Competitor from Database
</commit_message>
<xml_diff>
--- a/Database Logic.pptx
+++ b/Database Logic.pptx
@@ -12,8 +12,7 @@
     <p:sldId id="263" r:id="rId6"/>
     <p:sldId id="264" r:id="rId7"/>
     <p:sldId id="258" r:id="rId8"/>
-    <p:sldId id="260" r:id="rId9"/>
-    <p:sldId id="259" r:id="rId10"/>
+    <p:sldId id="259" r:id="rId9"/>
   </p:sldIdLst>
   <p:sldSz cx="12192000" cy="6858000"/>
   <p:notesSz cx="6858000" cy="9144000"/>
@@ -269,7 +268,7 @@
           <a:p>
             <a:fld id="{8E38A466-912F-4638-A4B7-9291465C9E2A}" type="datetimeFigureOut">
               <a:rPr lang="hr-HR" smtClean="0"/>
-              <a:t>5.3.2020.</a:t>
+              <a:t>7.3.2020.</a:t>
             </a:fld>
             <a:endParaRPr lang="hr-HR"/>
           </a:p>
@@ -469,7 +468,7 @@
           <a:p>
             <a:fld id="{8E38A466-912F-4638-A4B7-9291465C9E2A}" type="datetimeFigureOut">
               <a:rPr lang="hr-HR" smtClean="0"/>
-              <a:t>5.3.2020.</a:t>
+              <a:t>7.3.2020.</a:t>
             </a:fld>
             <a:endParaRPr lang="hr-HR"/>
           </a:p>
@@ -679,7 +678,7 @@
           <a:p>
             <a:fld id="{8E38A466-912F-4638-A4B7-9291465C9E2A}" type="datetimeFigureOut">
               <a:rPr lang="hr-HR" smtClean="0"/>
-              <a:t>5.3.2020.</a:t>
+              <a:t>7.3.2020.</a:t>
             </a:fld>
             <a:endParaRPr lang="hr-HR"/>
           </a:p>
@@ -879,7 +878,7 @@
           <a:p>
             <a:fld id="{8E38A466-912F-4638-A4B7-9291465C9E2A}" type="datetimeFigureOut">
               <a:rPr lang="hr-HR" smtClean="0"/>
-              <a:t>5.3.2020.</a:t>
+              <a:t>7.3.2020.</a:t>
             </a:fld>
             <a:endParaRPr lang="hr-HR"/>
           </a:p>
@@ -1155,7 +1154,7 @@
           <a:p>
             <a:fld id="{8E38A466-912F-4638-A4B7-9291465C9E2A}" type="datetimeFigureOut">
               <a:rPr lang="hr-HR" smtClean="0"/>
-              <a:t>5.3.2020.</a:t>
+              <a:t>7.3.2020.</a:t>
             </a:fld>
             <a:endParaRPr lang="hr-HR"/>
           </a:p>
@@ -1423,7 +1422,7 @@
           <a:p>
             <a:fld id="{8E38A466-912F-4638-A4B7-9291465C9E2A}" type="datetimeFigureOut">
               <a:rPr lang="hr-HR" smtClean="0"/>
-              <a:t>5.3.2020.</a:t>
+              <a:t>7.3.2020.</a:t>
             </a:fld>
             <a:endParaRPr lang="hr-HR"/>
           </a:p>
@@ -1838,7 +1837,7 @@
           <a:p>
             <a:fld id="{8E38A466-912F-4638-A4B7-9291465C9E2A}" type="datetimeFigureOut">
               <a:rPr lang="hr-HR" smtClean="0"/>
-              <a:t>5.3.2020.</a:t>
+              <a:t>7.3.2020.</a:t>
             </a:fld>
             <a:endParaRPr lang="hr-HR"/>
           </a:p>
@@ -1980,7 +1979,7 @@
           <a:p>
             <a:fld id="{8E38A466-912F-4638-A4B7-9291465C9E2A}" type="datetimeFigureOut">
               <a:rPr lang="hr-HR" smtClean="0"/>
-              <a:t>5.3.2020.</a:t>
+              <a:t>7.3.2020.</a:t>
             </a:fld>
             <a:endParaRPr lang="hr-HR"/>
           </a:p>
@@ -2093,7 +2092,7 @@
           <a:p>
             <a:fld id="{8E38A466-912F-4638-A4B7-9291465C9E2A}" type="datetimeFigureOut">
               <a:rPr lang="hr-HR" smtClean="0"/>
-              <a:t>5.3.2020.</a:t>
+              <a:t>7.3.2020.</a:t>
             </a:fld>
             <a:endParaRPr lang="hr-HR"/>
           </a:p>
@@ -2406,7 +2405,7 @@
           <a:p>
             <a:fld id="{8E38A466-912F-4638-A4B7-9291465C9E2A}" type="datetimeFigureOut">
               <a:rPr lang="hr-HR" smtClean="0"/>
-              <a:t>5.3.2020.</a:t>
+              <a:t>7.3.2020.</a:t>
             </a:fld>
             <a:endParaRPr lang="hr-HR"/>
           </a:p>
@@ -2695,7 +2694,7 @@
           <a:p>
             <a:fld id="{8E38A466-912F-4638-A4B7-9291465C9E2A}" type="datetimeFigureOut">
               <a:rPr lang="hr-HR" smtClean="0"/>
-              <a:t>5.3.2020.</a:t>
+              <a:t>7.3.2020.</a:t>
             </a:fld>
             <a:endParaRPr lang="hr-HR"/>
           </a:p>
@@ -2938,7 +2937,7 @@
           <a:p>
             <a:fld id="{8E38A466-912F-4638-A4B7-9291465C9E2A}" type="datetimeFigureOut">
               <a:rPr lang="hr-HR" smtClean="0"/>
-              <a:t>5.3.2020.</a:t>
+              <a:t>7.3.2020.</a:t>
             </a:fld>
             <a:endParaRPr lang="hr-HR"/>
           </a:p>
@@ -3369,7 +3368,7 @@
         </p:nvSpPr>
         <p:spPr>
           <a:xfrm>
-            <a:off x="250858" y="1758660"/>
+            <a:off x="1818362" y="1632194"/>
             <a:ext cx="2248930" cy="651138"/>
           </a:xfrm>
           <a:prstGeom prst="rect">
@@ -3419,7 +3418,7 @@
         </p:nvSpPr>
         <p:spPr>
           <a:xfrm>
-            <a:off x="250858" y="4451274"/>
+            <a:off x="1818362" y="4324808"/>
             <a:ext cx="2248930" cy="651138"/>
           </a:xfrm>
           <a:prstGeom prst="rect">
@@ -3469,7 +3468,7 @@
         </p:nvSpPr>
         <p:spPr>
           <a:xfrm>
-            <a:off x="6522335" y="3103431"/>
+            <a:off x="8089839" y="2976965"/>
             <a:ext cx="2248930" cy="651138"/>
           </a:xfrm>
           <a:prstGeom prst="rect">
@@ -3507,56 +3506,6 @@
       </p:sp>
       <p:sp>
         <p:nvSpPr>
-          <p:cNvPr id="7" name="Rectangle 6">
-            <a:extLst>
-              <a:ext uri="{FF2B5EF4-FFF2-40B4-BE49-F238E27FC236}">
-                <a16:creationId xmlns:a16="http://schemas.microsoft.com/office/drawing/2014/main" id="{D0DA6F98-8AD3-4AD3-A6C8-9DDF15400882}"/>
-              </a:ext>
-            </a:extLst>
-          </p:cNvPr>
-          <p:cNvSpPr/>
-          <p:nvPr/>
-        </p:nvSpPr>
-        <p:spPr>
-          <a:xfrm>
-            <a:off x="9741973" y="3103431"/>
-            <a:ext cx="2248930" cy="651138"/>
-          </a:xfrm>
-          <a:prstGeom prst="rect">
-            <a:avLst/>
-          </a:prstGeom>
-        </p:spPr>
-        <p:style>
-          <a:lnRef idx="2">
-            <a:schemeClr val="accent1">
-              <a:shade val="50000"/>
-            </a:schemeClr>
-          </a:lnRef>
-          <a:fillRef idx="1">
-            <a:schemeClr val="accent1"/>
-          </a:fillRef>
-          <a:effectRef idx="0">
-            <a:schemeClr val="accent1"/>
-          </a:effectRef>
-          <a:fontRef idx="minor">
-            <a:schemeClr val="lt1"/>
-          </a:fontRef>
-        </p:style>
-        <p:txBody>
-          <a:bodyPr rtlCol="0" anchor="ctr"/>
-          <a:lstStyle/>
-          <a:p>
-            <a:pPr algn="ctr"/>
-            <a:r>
-              <a:rPr lang="en-US" dirty="0"/>
-              <a:t>Competitor</a:t>
-            </a:r>
-            <a:endParaRPr lang="hr-HR" dirty="0"/>
-          </a:p>
-        </p:txBody>
-      </p:sp>
-      <p:sp>
-        <p:nvSpPr>
           <p:cNvPr id="14" name="TextBox 13">
             <a:extLst>
               <a:ext uri="{FF2B5EF4-FFF2-40B4-BE49-F238E27FC236}">
@@ -3569,7 +3518,7 @@
         </p:nvSpPr>
         <p:spPr>
           <a:xfrm>
-            <a:off x="1442317" y="2787511"/>
+            <a:off x="3009821" y="2661045"/>
             <a:ext cx="273612" cy="369332"/>
           </a:xfrm>
           <a:prstGeom prst="rect">
@@ -3609,7 +3558,7 @@
         </p:nvCxnSpPr>
         <p:spPr>
           <a:xfrm>
-            <a:off x="2499788" y="4776843"/>
+            <a:off x="4067292" y="4650377"/>
             <a:ext cx="958273" cy="1540"/>
           </a:xfrm>
           <a:prstGeom prst="straightConnector1">
@@ -3648,7 +3597,7 @@
         </p:nvSpPr>
         <p:spPr>
           <a:xfrm>
-            <a:off x="5927247" y="4383879"/>
+            <a:off x="7494751" y="4257413"/>
             <a:ext cx="273612" cy="369332"/>
           </a:xfrm>
           <a:prstGeom prst="rect">
@@ -3684,7 +3633,7 @@
         </p:nvSpPr>
         <p:spPr>
           <a:xfrm>
-            <a:off x="2682206" y="4423984"/>
+            <a:off x="4249710" y="4297518"/>
             <a:ext cx="313036" cy="369332"/>
           </a:xfrm>
           <a:prstGeom prst="rect">
@@ -3706,121 +3655,6 @@
           </a:p>
         </p:txBody>
       </p:sp>
-      <p:cxnSp>
-        <p:nvCxnSpPr>
-          <p:cNvPr id="20" name="Straight Arrow Connector 19">
-            <a:extLst>
-              <a:ext uri="{FF2B5EF4-FFF2-40B4-BE49-F238E27FC236}">
-                <a16:creationId xmlns:a16="http://schemas.microsoft.com/office/drawing/2014/main" id="{304A4CD3-9301-4A75-BE78-3EBC208C1F4B}"/>
-              </a:ext>
-            </a:extLst>
-          </p:cNvPr>
-          <p:cNvCxnSpPr>
-            <a:cxnSpLocks/>
-            <a:stCxn id="7" idx="1"/>
-            <a:endCxn id="6" idx="3"/>
-          </p:cNvCxnSpPr>
-          <p:nvPr/>
-        </p:nvCxnSpPr>
-        <p:spPr>
-          <a:xfrm flipH="1">
-            <a:off x="8771265" y="3429000"/>
-            <a:ext cx="970708" cy="0"/>
-          </a:xfrm>
-          <a:prstGeom prst="straightConnector1">
-            <a:avLst/>
-          </a:prstGeom>
-          <a:ln w="38100">
-            <a:tailEnd type="triangle"/>
-          </a:ln>
-        </p:spPr>
-        <p:style>
-          <a:lnRef idx="1">
-            <a:schemeClr val="accent2"/>
-          </a:lnRef>
-          <a:fillRef idx="0">
-            <a:schemeClr val="accent2"/>
-          </a:fillRef>
-          <a:effectRef idx="0">
-            <a:schemeClr val="accent2"/>
-          </a:effectRef>
-          <a:fontRef idx="minor">
-            <a:schemeClr val="tx1"/>
-          </a:fontRef>
-        </p:style>
-      </p:cxnSp>
-      <p:sp>
-        <p:nvSpPr>
-          <p:cNvPr id="21" name="TextBox 20">
-            <a:extLst>
-              <a:ext uri="{FF2B5EF4-FFF2-40B4-BE49-F238E27FC236}">
-                <a16:creationId xmlns:a16="http://schemas.microsoft.com/office/drawing/2014/main" id="{0ACC7037-7185-456E-A143-96C4D486D5DB}"/>
-              </a:ext>
-            </a:extLst>
-          </p:cNvPr>
-          <p:cNvSpPr txBox="1"/>
-          <p:nvPr/>
-        </p:nvSpPr>
-        <p:spPr>
-          <a:xfrm>
-            <a:off x="9465969" y="3479486"/>
-            <a:ext cx="247328" cy="369332"/>
-          </a:xfrm>
-          <a:prstGeom prst="rect">
-            <a:avLst/>
-          </a:prstGeom>
-          <a:noFill/>
-        </p:spPr>
-        <p:txBody>
-          <a:bodyPr wrap="square" rtlCol="0">
-            <a:spAutoFit/>
-          </a:bodyPr>
-          <a:lstStyle/>
-          <a:p>
-            <a:r>
-              <a:rPr lang="en-US" dirty="0"/>
-              <a:t>1</a:t>
-            </a:r>
-            <a:endParaRPr lang="hr-HR" dirty="0"/>
-          </a:p>
-        </p:txBody>
-      </p:sp>
-      <p:sp>
-        <p:nvSpPr>
-          <p:cNvPr id="22" name="TextBox 21">
-            <a:extLst>
-              <a:ext uri="{FF2B5EF4-FFF2-40B4-BE49-F238E27FC236}">
-                <a16:creationId xmlns:a16="http://schemas.microsoft.com/office/drawing/2014/main" id="{9C8DEFB0-5FDE-4806-90B5-DB157509CFAC}"/>
-              </a:ext>
-            </a:extLst>
-          </p:cNvPr>
-          <p:cNvSpPr txBox="1"/>
-          <p:nvPr/>
-        </p:nvSpPr>
-        <p:spPr>
-          <a:xfrm>
-            <a:off x="8799941" y="3037787"/>
-            <a:ext cx="247328" cy="369332"/>
-          </a:xfrm>
-          <a:prstGeom prst="rect">
-            <a:avLst/>
-          </a:prstGeom>
-          <a:noFill/>
-        </p:spPr>
-        <p:txBody>
-          <a:bodyPr wrap="square" rtlCol="0">
-            <a:spAutoFit/>
-          </a:bodyPr>
-          <a:lstStyle/>
-          <a:p>
-            <a:r>
-              <a:rPr lang="en-US" dirty="0"/>
-              <a:t>Z</a:t>
-            </a:r>
-            <a:endParaRPr lang="hr-HR" dirty="0"/>
-          </a:p>
-        </p:txBody>
-      </p:sp>
       <p:sp>
         <p:nvSpPr>
           <p:cNvPr id="16" name="Rectangle 15">
@@ -3835,7 +3669,7 @@
         </p:nvSpPr>
         <p:spPr>
           <a:xfrm>
-            <a:off x="6522335" y="1758660"/>
+            <a:off x="8089839" y="1632194"/>
             <a:ext cx="2248930" cy="651138"/>
           </a:xfrm>
           <a:prstGeom prst="rect">
@@ -3885,7 +3719,7 @@
         </p:nvSpPr>
         <p:spPr>
           <a:xfrm>
-            <a:off x="3458061" y="4331673"/>
+            <a:off x="5025565" y="4205207"/>
             <a:ext cx="2140870" cy="893420"/>
           </a:xfrm>
           <a:prstGeom prst="flowChartDecision">
@@ -3939,7 +3773,7 @@
         </p:nvCxnSpPr>
         <p:spPr>
           <a:xfrm>
-            <a:off x="7646800" y="2409798"/>
+            <a:off x="9214304" y="2283332"/>
             <a:ext cx="0" cy="693633"/>
           </a:xfrm>
           <a:prstGeom prst="straightConnector1">
@@ -3978,7 +3812,7 @@
         </p:nvSpPr>
         <p:spPr>
           <a:xfrm>
-            <a:off x="7332990" y="2387282"/>
+            <a:off x="8900494" y="2260816"/>
             <a:ext cx="247328" cy="369332"/>
           </a:xfrm>
           <a:prstGeom prst="rect">
@@ -4014,7 +3848,7 @@
         </p:nvSpPr>
         <p:spPr>
           <a:xfrm>
-            <a:off x="7761163" y="2768314"/>
+            <a:off x="9328667" y="2641848"/>
             <a:ext cx="247328" cy="369332"/>
           </a:xfrm>
           <a:prstGeom prst="rect">
@@ -4050,7 +3884,7 @@
         </p:nvSpPr>
         <p:spPr>
           <a:xfrm>
-            <a:off x="250858" y="3106209"/>
+            <a:off x="1818362" y="2979743"/>
             <a:ext cx="2248930" cy="651138"/>
           </a:xfrm>
           <a:prstGeom prst="rect">
@@ -4104,7 +3938,7 @@
         </p:nvCxnSpPr>
         <p:spPr>
           <a:xfrm>
-            <a:off x="1375323" y="3757347"/>
+            <a:off x="2942827" y="3630881"/>
             <a:ext cx="0" cy="693927"/>
           </a:xfrm>
           <a:prstGeom prst="straightConnector1">
@@ -4143,7 +3977,7 @@
         </p:nvSpPr>
         <p:spPr>
           <a:xfrm>
-            <a:off x="1025282" y="3713165"/>
+            <a:off x="2592786" y="3586699"/>
             <a:ext cx="247328" cy="369332"/>
           </a:xfrm>
           <a:prstGeom prst="rect">
@@ -4179,7 +4013,7 @@
         </p:nvSpPr>
         <p:spPr>
           <a:xfrm>
-            <a:off x="1456795" y="4115863"/>
+            <a:off x="3024299" y="3989397"/>
             <a:ext cx="247328" cy="369332"/>
           </a:xfrm>
           <a:prstGeom prst="rect">
@@ -4219,7 +4053,7 @@
         </p:nvCxnSpPr>
         <p:spPr>
           <a:xfrm>
-            <a:off x="1375323" y="2409798"/>
+            <a:off x="2942827" y="2283332"/>
             <a:ext cx="0" cy="696411"/>
           </a:xfrm>
           <a:prstGeom prst="straightConnector1">
@@ -4258,7 +4092,7 @@
         </p:nvSpPr>
         <p:spPr>
           <a:xfrm>
-            <a:off x="1025282" y="2375877"/>
+            <a:off x="2592786" y="2249411"/>
             <a:ext cx="247328" cy="369332"/>
           </a:xfrm>
           <a:prstGeom prst="rect">
@@ -4298,7 +4132,7 @@
         </p:nvCxnSpPr>
         <p:spPr>
           <a:xfrm flipH="1">
-            <a:off x="5598931" y="4773771"/>
+            <a:off x="7166435" y="4647305"/>
             <a:ext cx="923404" cy="4612"/>
           </a:xfrm>
           <a:prstGeom prst="straightConnector1">
@@ -4337,7 +4171,7 @@
         </p:nvSpPr>
         <p:spPr>
           <a:xfrm>
-            <a:off x="6522335" y="4448202"/>
+            <a:off x="8089839" y="4321736"/>
             <a:ext cx="2248930" cy="651138"/>
           </a:xfrm>
           <a:prstGeom prst="rect">
@@ -4391,7 +4225,7 @@
         </p:nvCxnSpPr>
         <p:spPr>
           <a:xfrm>
-            <a:off x="7646800" y="3754569"/>
+            <a:off x="9214304" y="3628103"/>
             <a:ext cx="0" cy="693633"/>
           </a:xfrm>
           <a:prstGeom prst="straightConnector1">
@@ -4430,7 +4264,7 @@
         </p:nvSpPr>
         <p:spPr>
           <a:xfrm>
-            <a:off x="7734879" y="4163132"/>
+            <a:off x="9302383" y="4036666"/>
             <a:ext cx="273612" cy="369332"/>
           </a:xfrm>
           <a:prstGeom prst="rect">
@@ -4466,7 +4300,7 @@
         </p:nvSpPr>
         <p:spPr>
           <a:xfrm>
-            <a:off x="7294436" y="3793800"/>
+            <a:off x="8861940" y="3667334"/>
             <a:ext cx="247328" cy="369332"/>
           </a:xfrm>
           <a:prstGeom prst="rect">
@@ -4502,7 +4336,7 @@
         </p:nvSpPr>
         <p:spPr>
           <a:xfrm>
-            <a:off x="834887" y="6003235"/>
+            <a:off x="1850543" y="5746268"/>
             <a:ext cx="8490914" cy="369332"/>
           </a:xfrm>
           <a:prstGeom prst="rect">
@@ -8482,14 +8316,14 @@
           <p:nvPr>
             <p:extLst>
               <p:ext uri="{D42A27DB-BD31-4B8C-83A1-F6EECF244321}">
-                <p14:modId xmlns:p14="http://schemas.microsoft.com/office/powerpoint/2010/main" val="1098985385"/>
+                <p14:modId xmlns:p14="http://schemas.microsoft.com/office/powerpoint/2010/main" val="3016887528"/>
               </p:ext>
             </p:extLst>
           </p:nvPr>
         </p:nvGraphicFramePr>
         <p:xfrm>
           <a:off x="189470" y="2709104"/>
-          <a:ext cx="7298009" cy="2214880"/>
+          <a:ext cx="8040131" cy="2214880"/>
         </p:xfrm>
         <a:graphic>
           <a:graphicData uri="http://schemas.openxmlformats.org/drawingml/2006/table">
@@ -8498,35 +8332,35 @@
                 <a:tableStyleId>{5C22544A-7EE6-4342-B048-85BDC9FD1C3A}</a:tableStyleId>
               </a:tblPr>
               <a:tblGrid>
-                <a:gridCol w="1126973">
+                <a:gridCol w="1241573">
                   <a:extLst>
                     <a:ext uri="{9D8B030D-6E8A-4147-A177-3AD203B41FA5}">
                       <a16:colId xmlns:a16="http://schemas.microsoft.com/office/drawing/2014/main" val="3459061120"/>
                     </a:ext>
                   </a:extLst>
                 </a:gridCol>
-                <a:gridCol w="1461014">
+                <a:gridCol w="1110276">
                   <a:extLst>
                     <a:ext uri="{9D8B030D-6E8A-4147-A177-3AD203B41FA5}">
                       <a16:colId xmlns:a16="http://schemas.microsoft.com/office/drawing/2014/main" val="3556585"/>
                     </a:ext>
                   </a:extLst>
                 </a:gridCol>
-                <a:gridCol w="1461014">
+                <a:gridCol w="1983180">
                   <a:extLst>
                     <a:ext uri="{9D8B030D-6E8A-4147-A177-3AD203B41FA5}">
                       <a16:colId xmlns:a16="http://schemas.microsoft.com/office/drawing/2014/main" val="2294876602"/>
                     </a:ext>
                   </a:extLst>
                 </a:gridCol>
-                <a:gridCol w="1870248">
+                <a:gridCol w="2186138">
                   <a:extLst>
                     <a:ext uri="{9D8B030D-6E8A-4147-A177-3AD203B41FA5}">
                       <a16:colId xmlns:a16="http://schemas.microsoft.com/office/drawing/2014/main" val="2195485728"/>
                     </a:ext>
                   </a:extLst>
                 </a:gridCol>
-                <a:gridCol w="1378760">
+                <a:gridCol w="1518964">
                   <a:extLst>
                     <a:ext uri="{9D8B030D-6E8A-4147-A177-3AD203B41FA5}">
                       <a16:colId xmlns:a16="http://schemas.microsoft.com/office/drawing/2014/main" val="1400196350"/>
@@ -8707,38 +8541,22 @@
                       </a:pPr>
                       <a:r>
                         <a:rPr lang="en-US" dirty="0"/>
-                        <a:t>1</a:t>
-                      </a:r>
-                      <a:endParaRPr lang="hr-HR" dirty="0"/>
-                    </a:p>
-                  </a:txBody>
-                  <a:tcPr/>
-                </a:tc>
-                <a:tc>
-                  <a:txBody>
-                    <a:bodyPr/>
-                    <a:lstStyle/>
-                    <a:p>
-                      <a:pPr marL="0" marR="0" lvl="0" indent="0" algn="ctr" defTabSz="914400" rtl="0" eaLnBrk="1" fontAlgn="auto" latinLnBrk="0" hangingPunct="1">
-                        <a:lnSpc>
-                          <a:spcPct val="100000"/>
-                        </a:lnSpc>
-                        <a:spcBef>
-                          <a:spcPts val="0"/>
-                        </a:spcBef>
-                        <a:spcAft>
-                          <a:spcPts val="0"/>
-                        </a:spcAft>
-                        <a:buClrTx/>
-                        <a:buSzTx/>
-                        <a:buFontTx/>
-                        <a:buNone/>
-                        <a:tabLst/>
-                        <a:defRPr/>
-                      </a:pPr>
-                      <a:r>
-                        <a:rPr lang="en-US" dirty="0"/>
-                        <a:t>2</a:t>
+                        <a:t>FC Barcelona</a:t>
+                      </a:r>
+                      <a:endParaRPr lang="hr-HR" dirty="0"/>
+                    </a:p>
+                  </a:txBody>
+                  <a:tcPr/>
+                </a:tc>
+                <a:tc>
+                  <a:txBody>
+                    <a:bodyPr/>
+                    <a:lstStyle/>
+                    <a:p>
+                      <a:pPr algn="ctr"/>
+                      <a:r>
+                        <a:rPr lang="en-US" dirty="0"/>
+                        <a:t>Real Madrid C.F.</a:t>
                       </a:r>
                       <a:endParaRPr lang="hr-HR" dirty="0"/>
                     </a:p>
@@ -8804,39 +8622,23 @@
                     <a:p>
                       <a:pPr algn="ctr"/>
                       <a:r>
-                        <a:rPr lang="en-US" dirty="0"/>
-                        <a:t>3</a:t>
-                      </a:r>
-                      <a:endParaRPr lang="hr-HR" dirty="0"/>
-                    </a:p>
-                  </a:txBody>
-                  <a:tcPr/>
-                </a:tc>
-                <a:tc>
-                  <a:txBody>
-                    <a:bodyPr/>
-                    <a:lstStyle/>
-                    <a:p>
-                      <a:pPr marL="0" marR="0" lvl="0" indent="0" algn="ctr" defTabSz="914400" rtl="0" eaLnBrk="1" fontAlgn="auto" latinLnBrk="0" hangingPunct="1">
-                        <a:lnSpc>
-                          <a:spcPct val="100000"/>
-                        </a:lnSpc>
-                        <a:spcBef>
-                          <a:spcPts val="0"/>
-                        </a:spcBef>
-                        <a:spcAft>
-                          <a:spcPts val="0"/>
-                        </a:spcAft>
-                        <a:buClrTx/>
-                        <a:buSzTx/>
-                        <a:buFontTx/>
-                        <a:buNone/>
-                        <a:tabLst/>
-                        <a:defRPr/>
-                      </a:pPr>
-                      <a:r>
-                        <a:rPr lang="en-US" dirty="0"/>
-                        <a:t>4</a:t>
+                        <a:rPr lang="en-US" dirty="0" err="1"/>
+                        <a:t>Cibona</a:t>
+                      </a:r>
+                      <a:endParaRPr lang="hr-HR" dirty="0"/>
+                    </a:p>
+                  </a:txBody>
+                  <a:tcPr/>
+                </a:tc>
+                <a:tc>
+                  <a:txBody>
+                    <a:bodyPr/>
+                    <a:lstStyle/>
+                    <a:p>
+                      <a:pPr algn="ctr"/>
+                      <a:r>
+                        <a:rPr lang="en-US" dirty="0" err="1"/>
+                        <a:t>Cedevita</a:t>
                       </a:r>
                       <a:endParaRPr lang="hr-HR" dirty="0"/>
                     </a:p>
@@ -8903,38 +8705,22 @@
                       <a:pPr algn="ctr"/>
                       <a:r>
                         <a:rPr lang="en-US" dirty="0"/>
-                        <a:t>5</a:t>
-                      </a:r>
-                      <a:endParaRPr lang="hr-HR" dirty="0"/>
-                    </a:p>
-                  </a:txBody>
-                  <a:tcPr/>
-                </a:tc>
-                <a:tc>
-                  <a:txBody>
-                    <a:bodyPr/>
-                    <a:lstStyle/>
-                    <a:p>
-                      <a:pPr marL="0" marR="0" lvl="0" indent="0" algn="ctr" defTabSz="914400" rtl="0" eaLnBrk="1" fontAlgn="auto" latinLnBrk="0" hangingPunct="1">
-                        <a:lnSpc>
-                          <a:spcPct val="100000"/>
-                        </a:lnSpc>
-                        <a:spcBef>
-                          <a:spcPts val="0"/>
-                        </a:spcBef>
-                        <a:spcAft>
-                          <a:spcPts val="0"/>
-                        </a:spcAft>
-                        <a:buClrTx/>
-                        <a:buSzTx/>
-                        <a:buFontTx/>
-                        <a:buNone/>
-                        <a:tabLst/>
-                        <a:defRPr/>
-                      </a:pPr>
-                      <a:r>
-                        <a:rPr lang="en-US" dirty="0"/>
-                        <a:t>6</a:t>
+                        <a:t>Rafael Nadal</a:t>
+                      </a:r>
+                      <a:endParaRPr lang="hr-HR" dirty="0"/>
+                    </a:p>
+                  </a:txBody>
+                  <a:tcPr/>
+                </a:tc>
+                <a:tc>
+                  <a:txBody>
+                    <a:bodyPr/>
+                    <a:lstStyle/>
+                    <a:p>
+                      <a:pPr algn="ctr"/>
+                      <a:r>
+                        <a:rPr lang="en-US" dirty="0"/>
+                        <a:t>Roger Federer</a:t>
                       </a:r>
                       <a:endParaRPr lang="hr-HR" dirty="0"/>
                     </a:p>
@@ -9001,38 +8787,22 @@
                       <a:pPr algn="ctr"/>
                       <a:r>
                         <a:rPr lang="en-US" dirty="0"/>
-                        <a:t>7</a:t>
-                      </a:r>
-                      <a:endParaRPr lang="hr-HR" dirty="0"/>
-                    </a:p>
-                  </a:txBody>
-                  <a:tcPr/>
-                </a:tc>
-                <a:tc>
-                  <a:txBody>
-                    <a:bodyPr/>
-                    <a:lstStyle/>
-                    <a:p>
-                      <a:pPr marL="0" marR="0" lvl="0" indent="0" algn="ctr" defTabSz="914400" rtl="0" eaLnBrk="1" fontAlgn="auto" latinLnBrk="0" hangingPunct="1">
-                        <a:lnSpc>
-                          <a:spcPct val="100000"/>
-                        </a:lnSpc>
-                        <a:spcBef>
-                          <a:spcPts val="0"/>
-                        </a:spcBef>
-                        <a:spcAft>
-                          <a:spcPts val="0"/>
-                        </a:spcAft>
-                        <a:buClrTx/>
-                        <a:buSzTx/>
-                        <a:buFontTx/>
-                        <a:buNone/>
-                        <a:tabLst/>
-                        <a:defRPr/>
-                      </a:pPr>
-                      <a:r>
-                        <a:rPr lang="en-US" dirty="0"/>
-                        <a:t>8</a:t>
+                        <a:t>Mladost</a:t>
+                      </a:r>
+                      <a:endParaRPr lang="hr-HR" dirty="0"/>
+                    </a:p>
+                  </a:txBody>
+                  <a:tcPr/>
+                </a:tc>
+                <a:tc>
+                  <a:txBody>
+                    <a:bodyPr/>
+                    <a:lstStyle/>
+                    <a:p>
+                      <a:pPr algn="ctr"/>
+                      <a:r>
+                        <a:rPr lang="en-US" dirty="0"/>
+                        <a:t>Jug</a:t>
                       </a:r>
                       <a:endParaRPr lang="hr-HR" dirty="0"/>
                     </a:p>
@@ -9096,57 +8866,25 @@
                     <a:bodyPr/>
                     <a:lstStyle/>
                     <a:p>
-                      <a:pPr marL="0" marR="0" lvl="0" indent="0" algn="ctr" defTabSz="914400" rtl="0" eaLnBrk="1" fontAlgn="auto" latinLnBrk="0" hangingPunct="1">
-                        <a:lnSpc>
-                          <a:spcPct val="100000"/>
-                        </a:lnSpc>
-                        <a:spcBef>
-                          <a:spcPts val="0"/>
-                        </a:spcBef>
-                        <a:spcAft>
-                          <a:spcPts val="0"/>
-                        </a:spcAft>
-                        <a:buClrTx/>
-                        <a:buSzTx/>
-                        <a:buFontTx/>
-                        <a:buNone/>
-                        <a:tabLst/>
-                        <a:defRPr/>
-                      </a:pPr>
-                      <a:r>
-                        <a:rPr lang="en-US" dirty="0"/>
-                        <a:t>9</a:t>
-                      </a:r>
-                      <a:endParaRPr lang="hr-HR" dirty="0"/>
-                    </a:p>
-                  </a:txBody>
-                  <a:tcPr/>
-                </a:tc>
-                <a:tc>
-                  <a:txBody>
-                    <a:bodyPr/>
-                    <a:lstStyle/>
-                    <a:p>
-                      <a:pPr marL="0" marR="0" lvl="0" indent="0" algn="ctr" defTabSz="914400" rtl="0" eaLnBrk="1" fontAlgn="auto" latinLnBrk="0" hangingPunct="1">
-                        <a:lnSpc>
-                          <a:spcPct val="100000"/>
-                        </a:lnSpc>
-                        <a:spcBef>
-                          <a:spcPts val="0"/>
-                        </a:spcBef>
-                        <a:spcAft>
-                          <a:spcPts val="0"/>
-                        </a:spcAft>
-                        <a:buClrTx/>
-                        <a:buSzTx/>
-                        <a:buFontTx/>
-                        <a:buNone/>
-                        <a:tabLst/>
-                        <a:defRPr/>
-                      </a:pPr>
-                      <a:r>
-                        <a:rPr lang="en-US" dirty="0"/>
-                        <a:t>10</a:t>
+                      <a:pPr algn="ctr"/>
+                      <a:r>
+                        <a:rPr lang="en-US" dirty="0"/>
+                        <a:t>Mike Tyson</a:t>
+                      </a:r>
+                      <a:endParaRPr lang="hr-HR" dirty="0"/>
+                    </a:p>
+                  </a:txBody>
+                  <a:tcPr/>
+                </a:tc>
+                <a:tc>
+                  <a:txBody>
+                    <a:bodyPr/>
+                    <a:lstStyle/>
+                    <a:p>
+                      <a:pPr algn="ctr"/>
+                      <a:r>
+                        <a:rPr lang="en-US" dirty="0"/>
+                        <a:t>Muhammad Ali</a:t>
                       </a:r>
                       <a:endParaRPr lang="hr-HR" dirty="0"/>
                     </a:p>
@@ -9192,731 +8930,6 @@
 </file>
 
 <file path=ppt/slides/slide8.xml><?xml version="1.0" encoding="utf-8"?>
-<p:sld xmlns:a="http://schemas.openxmlformats.org/drawingml/2006/main" xmlns:r="http://schemas.openxmlformats.org/officeDocument/2006/relationships" xmlns:p="http://schemas.openxmlformats.org/presentationml/2006/main">
-  <p:cSld>
-    <p:spTree>
-      <p:nvGrpSpPr>
-        <p:cNvPr id="1" name=""/>
-        <p:cNvGrpSpPr/>
-        <p:nvPr/>
-      </p:nvGrpSpPr>
-      <p:grpSpPr>
-        <a:xfrm>
-          <a:off x="0" y="0"/>
-          <a:ext cx="0" cy="0"/>
-          <a:chOff x="0" y="0"/>
-          <a:chExt cx="0" cy="0"/>
-        </a:xfrm>
-      </p:grpSpPr>
-      <p:sp>
-        <p:nvSpPr>
-          <p:cNvPr id="4" name="Rectangle 3">
-            <a:extLst>
-              <a:ext uri="{FF2B5EF4-FFF2-40B4-BE49-F238E27FC236}">
-                <a16:creationId xmlns:a16="http://schemas.microsoft.com/office/drawing/2014/main" id="{1E9DCB2C-BC60-40EF-A76B-C116E74B2D55}"/>
-              </a:ext>
-            </a:extLst>
-          </p:cNvPr>
-          <p:cNvSpPr/>
-          <p:nvPr/>
-        </p:nvSpPr>
-        <p:spPr>
-          <a:xfrm>
-            <a:off x="605482" y="313036"/>
-            <a:ext cx="2743200" cy="1062681"/>
-          </a:xfrm>
-          <a:prstGeom prst="rect">
-            <a:avLst/>
-          </a:prstGeom>
-        </p:spPr>
-        <p:style>
-          <a:lnRef idx="2">
-            <a:schemeClr val="accent1">
-              <a:shade val="50000"/>
-            </a:schemeClr>
-          </a:lnRef>
-          <a:fillRef idx="1">
-            <a:schemeClr val="accent1"/>
-          </a:fillRef>
-          <a:effectRef idx="0">
-            <a:schemeClr val="accent1"/>
-          </a:effectRef>
-          <a:fontRef idx="minor">
-            <a:schemeClr val="lt1"/>
-          </a:fontRef>
-        </p:style>
-        <p:txBody>
-          <a:bodyPr rtlCol="0" anchor="ctr"/>
-          <a:lstStyle/>
-          <a:p>
-            <a:pPr algn="ctr"/>
-            <a:r>
-              <a:rPr lang="en-US"/>
-              <a:t>Competitor</a:t>
-            </a:r>
-            <a:endParaRPr lang="hr-HR" dirty="0"/>
-          </a:p>
-        </p:txBody>
-      </p:sp>
-      <p:graphicFrame>
-        <p:nvGraphicFramePr>
-          <p:cNvPr id="2" name="Table 2">
-            <a:extLst>
-              <a:ext uri="{FF2B5EF4-FFF2-40B4-BE49-F238E27FC236}">
-                <a16:creationId xmlns:a16="http://schemas.microsoft.com/office/drawing/2014/main" id="{16FCD44F-8466-477E-BD23-48CA7ED90A43}"/>
-              </a:ext>
-            </a:extLst>
-          </p:cNvPr>
-          <p:cNvGraphicFramePr>
-            <a:graphicFrameLocks noGrp="1"/>
-          </p:cNvGraphicFramePr>
-          <p:nvPr>
-            <p:extLst>
-              <p:ext uri="{D42A27DB-BD31-4B8C-83A1-F6EECF244321}">
-                <p14:modId xmlns:p14="http://schemas.microsoft.com/office/powerpoint/2010/main" val="367809075"/>
-              </p:ext>
-            </p:extLst>
-          </p:nvPr>
-        </p:nvGraphicFramePr>
-        <p:xfrm>
-          <a:off x="605482" y="1708207"/>
-          <a:ext cx="6783858" cy="4079240"/>
-        </p:xfrm>
-        <a:graphic>
-          <a:graphicData uri="http://schemas.openxmlformats.org/drawingml/2006/table">
-            <a:tbl>
-              <a:tblPr firstRow="1" bandRow="1">
-                <a:tableStyleId>{5C22544A-7EE6-4342-B048-85BDC9FD1C3A}</a:tableStyleId>
-              </a:tblPr>
-              <a:tblGrid>
-                <a:gridCol w="1729946">
-                  <a:extLst>
-                    <a:ext uri="{9D8B030D-6E8A-4147-A177-3AD203B41FA5}">
-                      <a16:colId xmlns:a16="http://schemas.microsoft.com/office/drawing/2014/main" val="3459061120"/>
-                    </a:ext>
-                  </a:extLst>
-                </a:gridCol>
-                <a:gridCol w="2792626">
-                  <a:extLst>
-                    <a:ext uri="{9D8B030D-6E8A-4147-A177-3AD203B41FA5}">
-                      <a16:colId xmlns:a16="http://schemas.microsoft.com/office/drawing/2014/main" val="2294876602"/>
-                    </a:ext>
-                  </a:extLst>
-                </a:gridCol>
-                <a:gridCol w="2261286">
-                  <a:extLst>
-                    <a:ext uri="{9D8B030D-6E8A-4147-A177-3AD203B41FA5}">
-                      <a16:colId xmlns:a16="http://schemas.microsoft.com/office/drawing/2014/main" val="2195485728"/>
-                    </a:ext>
-                  </a:extLst>
-                </a:gridCol>
-              </a:tblGrid>
-              <a:tr h="370840">
-                <a:tc>
-                  <a:txBody>
-                    <a:bodyPr/>
-                    <a:lstStyle/>
-                    <a:p>
-                      <a:pPr algn="ctr"/>
-                      <a:r>
-                        <a:rPr lang="en-US" dirty="0" err="1"/>
-                        <a:t>Competitor_ID</a:t>
-                      </a:r>
-                      <a:endParaRPr lang="hr-HR" dirty="0"/>
-                    </a:p>
-                  </a:txBody>
-                  <a:tcPr/>
-                </a:tc>
-                <a:tc>
-                  <a:txBody>
-                    <a:bodyPr/>
-                    <a:lstStyle/>
-                    <a:p>
-                      <a:pPr algn="ctr"/>
-                      <a:r>
-                        <a:rPr lang="en-US" dirty="0"/>
-                        <a:t>Name</a:t>
-                      </a:r>
-                      <a:endParaRPr lang="hr-HR" dirty="0"/>
-                    </a:p>
-                  </a:txBody>
-                  <a:tcPr/>
-                </a:tc>
-                <a:tc>
-                  <a:txBody>
-                    <a:bodyPr/>
-                    <a:lstStyle/>
-                    <a:p>
-                      <a:pPr algn="ctr"/>
-                      <a:r>
-                        <a:rPr lang="en-US" dirty="0"/>
-                        <a:t>Sport</a:t>
-                      </a:r>
-                      <a:endParaRPr lang="hr-HR" dirty="0"/>
-                    </a:p>
-                  </a:txBody>
-                  <a:tcPr/>
-                </a:tc>
-                <a:extLst>
-                  <a:ext uri="{0D108BD9-81ED-4DB2-BD59-A6C34878D82A}">
-                    <a16:rowId xmlns:a16="http://schemas.microsoft.com/office/drawing/2014/main" val="1946083596"/>
-                  </a:ext>
-                </a:extLst>
-              </a:tr>
-              <a:tr h="370840">
-                <a:tc>
-                  <a:txBody>
-                    <a:bodyPr/>
-                    <a:lstStyle/>
-                    <a:p>
-                      <a:pPr algn="ctr"/>
-                      <a:r>
-                        <a:rPr lang="en-US" dirty="0"/>
-                        <a:t>1</a:t>
-                      </a:r>
-                      <a:endParaRPr lang="hr-HR" dirty="0"/>
-                    </a:p>
-                  </a:txBody>
-                  <a:tcPr/>
-                </a:tc>
-                <a:tc>
-                  <a:txBody>
-                    <a:bodyPr/>
-                    <a:lstStyle/>
-                    <a:p>
-                      <a:pPr marL="0" marR="0" lvl="0" indent="0" algn="ctr" defTabSz="914400" rtl="0" eaLnBrk="1" fontAlgn="auto" latinLnBrk="0" hangingPunct="1">
-                        <a:lnSpc>
-                          <a:spcPct val="100000"/>
-                        </a:lnSpc>
-                        <a:spcBef>
-                          <a:spcPts val="0"/>
-                        </a:spcBef>
-                        <a:spcAft>
-                          <a:spcPts val="0"/>
-                        </a:spcAft>
-                        <a:buClrTx/>
-                        <a:buSzTx/>
-                        <a:buFontTx/>
-                        <a:buNone/>
-                        <a:tabLst/>
-                        <a:defRPr/>
-                      </a:pPr>
-                      <a:r>
-                        <a:rPr lang="en-US" dirty="0"/>
-                        <a:t>FC Barcelona</a:t>
-                      </a:r>
-                      <a:endParaRPr lang="hr-HR" dirty="0"/>
-                    </a:p>
-                  </a:txBody>
-                  <a:tcPr/>
-                </a:tc>
-                <a:tc>
-                  <a:txBody>
-                    <a:bodyPr/>
-                    <a:lstStyle/>
-                    <a:p>
-                      <a:pPr algn="ctr"/>
-                      <a:r>
-                        <a:rPr lang="en-US" dirty="0"/>
-                        <a:t>Football</a:t>
-                      </a:r>
-                      <a:endParaRPr lang="hr-HR" dirty="0"/>
-                    </a:p>
-                  </a:txBody>
-                  <a:tcPr/>
-                </a:tc>
-                <a:extLst>
-                  <a:ext uri="{0D108BD9-81ED-4DB2-BD59-A6C34878D82A}">
-                    <a16:rowId xmlns:a16="http://schemas.microsoft.com/office/drawing/2014/main" val="3920316459"/>
-                  </a:ext>
-                </a:extLst>
-              </a:tr>
-              <a:tr h="370840">
-                <a:tc>
-                  <a:txBody>
-                    <a:bodyPr/>
-                    <a:lstStyle/>
-                    <a:p>
-                      <a:pPr algn="ctr"/>
-                      <a:r>
-                        <a:rPr lang="en-US" dirty="0"/>
-                        <a:t>2</a:t>
-                      </a:r>
-                      <a:endParaRPr lang="hr-HR" dirty="0"/>
-                    </a:p>
-                  </a:txBody>
-                  <a:tcPr/>
-                </a:tc>
-                <a:tc>
-                  <a:txBody>
-                    <a:bodyPr/>
-                    <a:lstStyle/>
-                    <a:p>
-                      <a:pPr algn="ctr"/>
-                      <a:r>
-                        <a:rPr lang="en-US" dirty="0"/>
-                        <a:t>Real Madrid C.F.</a:t>
-                      </a:r>
-                      <a:endParaRPr lang="hr-HR" dirty="0"/>
-                    </a:p>
-                  </a:txBody>
-                  <a:tcPr/>
-                </a:tc>
-                <a:tc>
-                  <a:txBody>
-                    <a:bodyPr/>
-                    <a:lstStyle/>
-                    <a:p>
-                      <a:pPr algn="ctr"/>
-                      <a:r>
-                        <a:rPr lang="en-US" dirty="0"/>
-                        <a:t>Football</a:t>
-                      </a:r>
-                      <a:endParaRPr lang="hr-HR" dirty="0"/>
-                    </a:p>
-                  </a:txBody>
-                  <a:tcPr/>
-                </a:tc>
-                <a:extLst>
-                  <a:ext uri="{0D108BD9-81ED-4DB2-BD59-A6C34878D82A}">
-                    <a16:rowId xmlns:a16="http://schemas.microsoft.com/office/drawing/2014/main" val="1966806956"/>
-                  </a:ext>
-                </a:extLst>
-              </a:tr>
-              <a:tr h="370840">
-                <a:tc>
-                  <a:txBody>
-                    <a:bodyPr/>
-                    <a:lstStyle/>
-                    <a:p>
-                      <a:pPr algn="ctr"/>
-                      <a:r>
-                        <a:rPr lang="en-US" dirty="0"/>
-                        <a:t>3</a:t>
-                      </a:r>
-                      <a:endParaRPr lang="hr-HR" dirty="0"/>
-                    </a:p>
-                  </a:txBody>
-                  <a:tcPr/>
-                </a:tc>
-                <a:tc>
-                  <a:txBody>
-                    <a:bodyPr/>
-                    <a:lstStyle/>
-                    <a:p>
-                      <a:pPr algn="ctr"/>
-                      <a:r>
-                        <a:rPr lang="en-US" dirty="0" err="1"/>
-                        <a:t>Cibona</a:t>
-                      </a:r>
-                      <a:endParaRPr lang="hr-HR" dirty="0"/>
-                    </a:p>
-                  </a:txBody>
-                  <a:tcPr/>
-                </a:tc>
-                <a:tc>
-                  <a:txBody>
-                    <a:bodyPr/>
-                    <a:lstStyle/>
-                    <a:p>
-                      <a:pPr algn="ctr"/>
-                      <a:r>
-                        <a:rPr lang="en-US" dirty="0"/>
-                        <a:t>Basketball</a:t>
-                      </a:r>
-                      <a:endParaRPr lang="hr-HR" dirty="0"/>
-                    </a:p>
-                  </a:txBody>
-                  <a:tcPr/>
-                </a:tc>
-                <a:extLst>
-                  <a:ext uri="{0D108BD9-81ED-4DB2-BD59-A6C34878D82A}">
-                    <a16:rowId xmlns:a16="http://schemas.microsoft.com/office/drawing/2014/main" val="2179751259"/>
-                  </a:ext>
-                </a:extLst>
-              </a:tr>
-              <a:tr h="370840">
-                <a:tc>
-                  <a:txBody>
-                    <a:bodyPr/>
-                    <a:lstStyle/>
-                    <a:p>
-                      <a:pPr algn="ctr"/>
-                      <a:r>
-                        <a:rPr lang="en-US" dirty="0"/>
-                        <a:t>4</a:t>
-                      </a:r>
-                      <a:endParaRPr lang="hr-HR" dirty="0"/>
-                    </a:p>
-                  </a:txBody>
-                  <a:tcPr/>
-                </a:tc>
-                <a:tc>
-                  <a:txBody>
-                    <a:bodyPr/>
-                    <a:lstStyle/>
-                    <a:p>
-                      <a:pPr algn="ctr"/>
-                      <a:r>
-                        <a:rPr lang="en-US" dirty="0" err="1"/>
-                        <a:t>Cedevita</a:t>
-                      </a:r>
-                      <a:endParaRPr lang="hr-HR" dirty="0"/>
-                    </a:p>
-                  </a:txBody>
-                  <a:tcPr/>
-                </a:tc>
-                <a:tc>
-                  <a:txBody>
-                    <a:bodyPr/>
-                    <a:lstStyle/>
-                    <a:p>
-                      <a:pPr algn="ctr"/>
-                      <a:r>
-                        <a:rPr lang="en-US" dirty="0"/>
-                        <a:t>Basketball</a:t>
-                      </a:r>
-                      <a:endParaRPr lang="hr-HR" dirty="0"/>
-                    </a:p>
-                  </a:txBody>
-                  <a:tcPr/>
-                </a:tc>
-                <a:extLst>
-                  <a:ext uri="{0D108BD9-81ED-4DB2-BD59-A6C34878D82A}">
-                    <a16:rowId xmlns:a16="http://schemas.microsoft.com/office/drawing/2014/main" val="3510268340"/>
-                  </a:ext>
-                </a:extLst>
-              </a:tr>
-              <a:tr h="370840">
-                <a:tc>
-                  <a:txBody>
-                    <a:bodyPr/>
-                    <a:lstStyle/>
-                    <a:p>
-                      <a:pPr algn="ctr"/>
-                      <a:r>
-                        <a:rPr lang="en-US" dirty="0"/>
-                        <a:t>5</a:t>
-                      </a:r>
-                      <a:endParaRPr lang="hr-HR" dirty="0"/>
-                    </a:p>
-                  </a:txBody>
-                  <a:tcPr/>
-                </a:tc>
-                <a:tc>
-                  <a:txBody>
-                    <a:bodyPr/>
-                    <a:lstStyle/>
-                    <a:p>
-                      <a:pPr algn="ctr"/>
-                      <a:r>
-                        <a:rPr lang="en-US" dirty="0"/>
-                        <a:t>Rafael Nadal</a:t>
-                      </a:r>
-                      <a:endParaRPr lang="hr-HR" dirty="0"/>
-                    </a:p>
-                  </a:txBody>
-                  <a:tcPr/>
-                </a:tc>
-                <a:tc>
-                  <a:txBody>
-                    <a:bodyPr/>
-                    <a:lstStyle/>
-                    <a:p>
-                      <a:pPr algn="ctr"/>
-                      <a:r>
-                        <a:rPr lang="en-US" dirty="0"/>
-                        <a:t>Tennis</a:t>
-                      </a:r>
-                      <a:endParaRPr lang="hr-HR" dirty="0"/>
-                    </a:p>
-                  </a:txBody>
-                  <a:tcPr/>
-                </a:tc>
-                <a:extLst>
-                  <a:ext uri="{0D108BD9-81ED-4DB2-BD59-A6C34878D82A}">
-                    <a16:rowId xmlns:a16="http://schemas.microsoft.com/office/drawing/2014/main" val="2443874652"/>
-                  </a:ext>
-                </a:extLst>
-              </a:tr>
-              <a:tr h="370840">
-                <a:tc>
-                  <a:txBody>
-                    <a:bodyPr/>
-                    <a:lstStyle/>
-                    <a:p>
-                      <a:pPr algn="ctr"/>
-                      <a:r>
-                        <a:rPr lang="en-US" dirty="0"/>
-                        <a:t>6</a:t>
-                      </a:r>
-                      <a:endParaRPr lang="hr-HR" dirty="0"/>
-                    </a:p>
-                  </a:txBody>
-                  <a:tcPr/>
-                </a:tc>
-                <a:tc>
-                  <a:txBody>
-                    <a:bodyPr/>
-                    <a:lstStyle/>
-                    <a:p>
-                      <a:pPr algn="ctr"/>
-                      <a:r>
-                        <a:rPr lang="en-US" dirty="0"/>
-                        <a:t>Roger Federer</a:t>
-                      </a:r>
-                      <a:endParaRPr lang="hr-HR" dirty="0"/>
-                    </a:p>
-                  </a:txBody>
-                  <a:tcPr/>
-                </a:tc>
-                <a:tc>
-                  <a:txBody>
-                    <a:bodyPr/>
-                    <a:lstStyle/>
-                    <a:p>
-                      <a:pPr algn="ctr"/>
-                      <a:r>
-                        <a:rPr lang="en-US" dirty="0"/>
-                        <a:t>Tennis</a:t>
-                      </a:r>
-                      <a:endParaRPr lang="hr-HR" dirty="0"/>
-                    </a:p>
-                  </a:txBody>
-                  <a:tcPr/>
-                </a:tc>
-                <a:extLst>
-                  <a:ext uri="{0D108BD9-81ED-4DB2-BD59-A6C34878D82A}">
-                    <a16:rowId xmlns:a16="http://schemas.microsoft.com/office/drawing/2014/main" val="2093736835"/>
-                  </a:ext>
-                </a:extLst>
-              </a:tr>
-              <a:tr h="370840">
-                <a:tc>
-                  <a:txBody>
-                    <a:bodyPr/>
-                    <a:lstStyle/>
-                    <a:p>
-                      <a:pPr algn="ctr"/>
-                      <a:r>
-                        <a:rPr lang="en-US" dirty="0"/>
-                        <a:t>7</a:t>
-                      </a:r>
-                      <a:endParaRPr lang="hr-HR" dirty="0"/>
-                    </a:p>
-                  </a:txBody>
-                  <a:tcPr/>
-                </a:tc>
-                <a:tc>
-                  <a:txBody>
-                    <a:bodyPr/>
-                    <a:lstStyle/>
-                    <a:p>
-                      <a:pPr algn="ctr"/>
-                      <a:r>
-                        <a:rPr lang="en-US" dirty="0"/>
-                        <a:t>Mladost</a:t>
-                      </a:r>
-                      <a:endParaRPr lang="hr-HR" dirty="0"/>
-                    </a:p>
-                  </a:txBody>
-                  <a:tcPr/>
-                </a:tc>
-                <a:tc>
-                  <a:txBody>
-                    <a:bodyPr/>
-                    <a:lstStyle/>
-                    <a:p>
-                      <a:pPr algn="ctr"/>
-                      <a:r>
-                        <a:rPr lang="en-US" dirty="0" err="1"/>
-                        <a:t>Waterpolo</a:t>
-                      </a:r>
-                      <a:endParaRPr lang="hr-HR" dirty="0"/>
-                    </a:p>
-                  </a:txBody>
-                  <a:tcPr/>
-                </a:tc>
-                <a:extLst>
-                  <a:ext uri="{0D108BD9-81ED-4DB2-BD59-A6C34878D82A}">
-                    <a16:rowId xmlns:a16="http://schemas.microsoft.com/office/drawing/2014/main" val="3368030609"/>
-                  </a:ext>
-                </a:extLst>
-              </a:tr>
-              <a:tr h="370840">
-                <a:tc>
-                  <a:txBody>
-                    <a:bodyPr/>
-                    <a:lstStyle/>
-                    <a:p>
-                      <a:pPr algn="ctr"/>
-                      <a:r>
-                        <a:rPr lang="en-US" dirty="0"/>
-                        <a:t>8</a:t>
-                      </a:r>
-                      <a:endParaRPr lang="hr-HR" dirty="0"/>
-                    </a:p>
-                  </a:txBody>
-                  <a:tcPr/>
-                </a:tc>
-                <a:tc>
-                  <a:txBody>
-                    <a:bodyPr/>
-                    <a:lstStyle/>
-                    <a:p>
-                      <a:pPr algn="ctr"/>
-                      <a:r>
-                        <a:rPr lang="en-US" dirty="0"/>
-                        <a:t>Jug</a:t>
-                      </a:r>
-                      <a:endParaRPr lang="hr-HR" dirty="0"/>
-                    </a:p>
-                  </a:txBody>
-                  <a:tcPr/>
-                </a:tc>
-                <a:tc>
-                  <a:txBody>
-                    <a:bodyPr/>
-                    <a:lstStyle/>
-                    <a:p>
-                      <a:pPr algn="ctr"/>
-                      <a:r>
-                        <a:rPr lang="en-US" dirty="0" err="1"/>
-                        <a:t>Waterpolo</a:t>
-                      </a:r>
-                      <a:endParaRPr lang="hr-HR" dirty="0"/>
-                    </a:p>
-                  </a:txBody>
-                  <a:tcPr/>
-                </a:tc>
-                <a:extLst>
-                  <a:ext uri="{0D108BD9-81ED-4DB2-BD59-A6C34878D82A}">
-                    <a16:rowId xmlns:a16="http://schemas.microsoft.com/office/drawing/2014/main" val="3268638376"/>
-                  </a:ext>
-                </a:extLst>
-              </a:tr>
-              <a:tr h="370840">
-                <a:tc>
-                  <a:txBody>
-                    <a:bodyPr/>
-                    <a:lstStyle/>
-                    <a:p>
-                      <a:pPr algn="ctr"/>
-                      <a:r>
-                        <a:rPr lang="en-US" dirty="0"/>
-                        <a:t>9</a:t>
-                      </a:r>
-                      <a:endParaRPr lang="hr-HR" dirty="0"/>
-                    </a:p>
-                  </a:txBody>
-                  <a:tcPr/>
-                </a:tc>
-                <a:tc>
-                  <a:txBody>
-                    <a:bodyPr/>
-                    <a:lstStyle/>
-                    <a:p>
-                      <a:pPr algn="ctr"/>
-                      <a:r>
-                        <a:rPr lang="en-US" dirty="0"/>
-                        <a:t>Mike Tyson</a:t>
-                      </a:r>
-                      <a:endParaRPr lang="hr-HR" dirty="0"/>
-                    </a:p>
-                  </a:txBody>
-                  <a:tcPr/>
-                </a:tc>
-                <a:tc>
-                  <a:txBody>
-                    <a:bodyPr/>
-                    <a:lstStyle/>
-                    <a:p>
-                      <a:pPr algn="ctr"/>
-                      <a:r>
-                        <a:rPr lang="en-US" dirty="0"/>
-                        <a:t>Boxing</a:t>
-                      </a:r>
-                      <a:endParaRPr lang="hr-HR" dirty="0"/>
-                    </a:p>
-                  </a:txBody>
-                  <a:tcPr/>
-                </a:tc>
-                <a:extLst>
-                  <a:ext uri="{0D108BD9-81ED-4DB2-BD59-A6C34878D82A}">
-                    <a16:rowId xmlns:a16="http://schemas.microsoft.com/office/drawing/2014/main" val="3501477304"/>
-                  </a:ext>
-                </a:extLst>
-              </a:tr>
-              <a:tr h="370840">
-                <a:tc>
-                  <a:txBody>
-                    <a:bodyPr/>
-                    <a:lstStyle/>
-                    <a:p>
-                      <a:pPr algn="ctr"/>
-                      <a:r>
-                        <a:rPr lang="en-US" dirty="0"/>
-                        <a:t>10</a:t>
-                      </a:r>
-                      <a:endParaRPr lang="hr-HR" dirty="0"/>
-                    </a:p>
-                  </a:txBody>
-                  <a:tcPr/>
-                </a:tc>
-                <a:tc>
-                  <a:txBody>
-                    <a:bodyPr/>
-                    <a:lstStyle/>
-                    <a:p>
-                      <a:pPr algn="ctr"/>
-                      <a:r>
-                        <a:rPr lang="en-US" dirty="0"/>
-                        <a:t>Muhammad Ali</a:t>
-                      </a:r>
-                      <a:endParaRPr lang="hr-HR" dirty="0"/>
-                    </a:p>
-                  </a:txBody>
-                  <a:tcPr/>
-                </a:tc>
-                <a:tc>
-                  <a:txBody>
-                    <a:bodyPr/>
-                    <a:lstStyle/>
-                    <a:p>
-                      <a:pPr algn="ctr"/>
-                      <a:r>
-                        <a:rPr lang="en-US" dirty="0"/>
-                        <a:t>Boxing</a:t>
-                      </a:r>
-                      <a:endParaRPr lang="hr-HR" dirty="0"/>
-                    </a:p>
-                  </a:txBody>
-                  <a:tcPr/>
-                </a:tc>
-                <a:extLst>
-                  <a:ext uri="{0D108BD9-81ED-4DB2-BD59-A6C34878D82A}">
-                    <a16:rowId xmlns:a16="http://schemas.microsoft.com/office/drawing/2014/main" val="4238014092"/>
-                  </a:ext>
-                </a:extLst>
-              </a:tr>
-            </a:tbl>
-          </a:graphicData>
-        </a:graphic>
-      </p:graphicFrame>
-    </p:spTree>
-    <p:extLst>
-      <p:ext uri="{BB962C8B-B14F-4D97-AF65-F5344CB8AC3E}">
-        <p14:creationId xmlns:p14="http://schemas.microsoft.com/office/powerpoint/2010/main" val="4014128254"/>
-      </p:ext>
-    </p:extLst>
-  </p:cSld>
-  <p:clrMapOvr>
-    <a:masterClrMapping/>
-  </p:clrMapOvr>
-</p:sld>
-</file>
-
-<file path=ppt/slides/slide9.xml><?xml version="1.0" encoding="utf-8"?>
 <p:sld xmlns:a="http://schemas.openxmlformats.org/drawingml/2006/main" xmlns:r="http://schemas.openxmlformats.org/officeDocument/2006/relationships" xmlns:p="http://schemas.openxmlformats.org/presentationml/2006/main">
   <p:cSld>
     <p:spTree>

</xml_diff>

<commit_message>
Adding ticket with all constraints
</commit_message>
<xml_diff>
--- a/Database Logic.pptx
+++ b/Database Logic.pptx
@@ -268,7 +268,7 @@
           <a:p>
             <a:fld id="{8E38A466-912F-4638-A4B7-9291465C9E2A}" type="datetimeFigureOut">
               <a:rPr lang="hr-HR" smtClean="0"/>
-              <a:t>7.3.2020.</a:t>
+              <a:t>11.3.2020.</a:t>
             </a:fld>
             <a:endParaRPr lang="hr-HR"/>
           </a:p>
@@ -468,7 +468,7 @@
           <a:p>
             <a:fld id="{8E38A466-912F-4638-A4B7-9291465C9E2A}" type="datetimeFigureOut">
               <a:rPr lang="hr-HR" smtClean="0"/>
-              <a:t>7.3.2020.</a:t>
+              <a:t>11.3.2020.</a:t>
             </a:fld>
             <a:endParaRPr lang="hr-HR"/>
           </a:p>
@@ -678,7 +678,7 @@
           <a:p>
             <a:fld id="{8E38A466-912F-4638-A4B7-9291465C9E2A}" type="datetimeFigureOut">
               <a:rPr lang="hr-HR" smtClean="0"/>
-              <a:t>7.3.2020.</a:t>
+              <a:t>11.3.2020.</a:t>
             </a:fld>
             <a:endParaRPr lang="hr-HR"/>
           </a:p>
@@ -878,7 +878,7 @@
           <a:p>
             <a:fld id="{8E38A466-912F-4638-A4B7-9291465C9E2A}" type="datetimeFigureOut">
               <a:rPr lang="hr-HR" smtClean="0"/>
-              <a:t>7.3.2020.</a:t>
+              <a:t>11.3.2020.</a:t>
             </a:fld>
             <a:endParaRPr lang="hr-HR"/>
           </a:p>
@@ -1154,7 +1154,7 @@
           <a:p>
             <a:fld id="{8E38A466-912F-4638-A4B7-9291465C9E2A}" type="datetimeFigureOut">
               <a:rPr lang="hr-HR" smtClean="0"/>
-              <a:t>7.3.2020.</a:t>
+              <a:t>11.3.2020.</a:t>
             </a:fld>
             <a:endParaRPr lang="hr-HR"/>
           </a:p>
@@ -1422,7 +1422,7 @@
           <a:p>
             <a:fld id="{8E38A466-912F-4638-A4B7-9291465C9E2A}" type="datetimeFigureOut">
               <a:rPr lang="hr-HR" smtClean="0"/>
-              <a:t>7.3.2020.</a:t>
+              <a:t>11.3.2020.</a:t>
             </a:fld>
             <a:endParaRPr lang="hr-HR"/>
           </a:p>
@@ -1837,7 +1837,7 @@
           <a:p>
             <a:fld id="{8E38A466-912F-4638-A4B7-9291465C9E2A}" type="datetimeFigureOut">
               <a:rPr lang="hr-HR" smtClean="0"/>
-              <a:t>7.3.2020.</a:t>
+              <a:t>11.3.2020.</a:t>
             </a:fld>
             <a:endParaRPr lang="hr-HR"/>
           </a:p>
@@ -1979,7 +1979,7 @@
           <a:p>
             <a:fld id="{8E38A466-912F-4638-A4B7-9291465C9E2A}" type="datetimeFigureOut">
               <a:rPr lang="hr-HR" smtClean="0"/>
-              <a:t>7.3.2020.</a:t>
+              <a:t>11.3.2020.</a:t>
             </a:fld>
             <a:endParaRPr lang="hr-HR"/>
           </a:p>
@@ -2092,7 +2092,7 @@
           <a:p>
             <a:fld id="{8E38A466-912F-4638-A4B7-9291465C9E2A}" type="datetimeFigureOut">
               <a:rPr lang="hr-HR" smtClean="0"/>
-              <a:t>7.3.2020.</a:t>
+              <a:t>11.3.2020.</a:t>
             </a:fld>
             <a:endParaRPr lang="hr-HR"/>
           </a:p>
@@ -2405,7 +2405,7 @@
           <a:p>
             <a:fld id="{8E38A466-912F-4638-A4B7-9291465C9E2A}" type="datetimeFigureOut">
               <a:rPr lang="hr-HR" smtClean="0"/>
-              <a:t>7.3.2020.</a:t>
+              <a:t>11.3.2020.</a:t>
             </a:fld>
             <a:endParaRPr lang="hr-HR"/>
           </a:p>
@@ -2694,7 +2694,7 @@
           <a:p>
             <a:fld id="{8E38A466-912F-4638-A4B7-9291465C9E2A}" type="datetimeFigureOut">
               <a:rPr lang="hr-HR" smtClean="0"/>
-              <a:t>7.3.2020.</a:t>
+              <a:t>11.3.2020.</a:t>
             </a:fld>
             <a:endParaRPr lang="hr-HR"/>
           </a:p>
@@ -2937,7 +2937,7 @@
           <a:p>
             <a:fld id="{8E38A466-912F-4638-A4B7-9291465C9E2A}" type="datetimeFigureOut">
               <a:rPr lang="hr-HR" smtClean="0"/>
-              <a:t>7.3.2020.</a:t>
+              <a:t>11.3.2020.</a:t>
             </a:fld>
             <a:endParaRPr lang="hr-HR"/>
           </a:p>
@@ -6890,14 +6890,14 @@
           <p:nvPr>
             <p:extLst>
               <p:ext uri="{D42A27DB-BD31-4B8C-83A1-F6EECF244321}">
-                <p14:modId xmlns:p14="http://schemas.microsoft.com/office/powerpoint/2010/main" val="616142504"/>
+                <p14:modId xmlns:p14="http://schemas.microsoft.com/office/powerpoint/2010/main" val="795564941"/>
               </p:ext>
             </p:extLst>
           </p:nvPr>
         </p:nvGraphicFramePr>
         <p:xfrm>
           <a:off x="605482" y="2709104"/>
-          <a:ext cx="9187876" cy="2590800"/>
+          <a:ext cx="10244226" cy="2590800"/>
         </p:xfrm>
         <a:graphic>
           <a:graphicData uri="http://schemas.openxmlformats.org/drawingml/2006/table">
@@ -6906,63 +6906,63 @@
                 <a:tableStyleId>{5C22544A-7EE6-4342-B048-85BDC9FD1C3A}</a:tableStyleId>
               </a:tblPr>
               <a:tblGrid>
-                <a:gridCol w="1235038">
+                <a:gridCol w="1226721">
                   <a:extLst>
                     <a:ext uri="{9D8B030D-6E8A-4147-A177-3AD203B41FA5}">
                       <a16:colId xmlns:a16="http://schemas.microsoft.com/office/drawing/2014/main" val="3459061120"/>
                     </a:ext>
                   </a:extLst>
                 </a:gridCol>
-                <a:gridCol w="1065236">
+                <a:gridCol w="1338020">
                   <a:extLst>
                     <a:ext uri="{9D8B030D-6E8A-4147-A177-3AD203B41FA5}">
                       <a16:colId xmlns:a16="http://schemas.microsoft.com/office/drawing/2014/main" val="2294876602"/>
                     </a:ext>
                   </a:extLst>
                 </a:gridCol>
-                <a:gridCol w="963879">
+                <a:gridCol w="1074698">
                   <a:extLst>
                     <a:ext uri="{9D8B030D-6E8A-4147-A177-3AD203B41FA5}">
                       <a16:colId xmlns:a16="http://schemas.microsoft.com/office/drawing/2014/main" val="3166356276"/>
                     </a:ext>
                   </a:extLst>
                 </a:gridCol>
-                <a:gridCol w="874643">
+                <a:gridCol w="975203">
                   <a:extLst>
                     <a:ext uri="{9D8B030D-6E8A-4147-A177-3AD203B41FA5}">
                       <a16:colId xmlns:a16="http://schemas.microsoft.com/office/drawing/2014/main" val="3737551350"/>
                     </a:ext>
                   </a:extLst>
                 </a:gridCol>
-                <a:gridCol w="1060174">
+                <a:gridCol w="1182065">
                   <a:extLst>
                     <a:ext uri="{9D8B030D-6E8A-4147-A177-3AD203B41FA5}">
                       <a16:colId xmlns:a16="http://schemas.microsoft.com/office/drawing/2014/main" val="2055177112"/>
                     </a:ext>
                   </a:extLst>
                 </a:gridCol>
-                <a:gridCol w="940905">
+                <a:gridCol w="1049083">
                   <a:extLst>
                     <a:ext uri="{9D8B030D-6E8A-4147-A177-3AD203B41FA5}">
                       <a16:colId xmlns:a16="http://schemas.microsoft.com/office/drawing/2014/main" val="1072207219"/>
                     </a:ext>
                   </a:extLst>
                 </a:gridCol>
-                <a:gridCol w="861391">
+                <a:gridCol w="960427">
                   <a:extLst>
                     <a:ext uri="{9D8B030D-6E8A-4147-A177-3AD203B41FA5}">
                       <a16:colId xmlns:a16="http://schemas.microsoft.com/office/drawing/2014/main" val="1011915479"/>
                     </a:ext>
                   </a:extLst>
                 </a:gridCol>
-                <a:gridCol w="848139">
+                <a:gridCol w="945651">
                   <a:extLst>
                     <a:ext uri="{9D8B030D-6E8A-4147-A177-3AD203B41FA5}">
                       <a16:colId xmlns:a16="http://schemas.microsoft.com/office/drawing/2014/main" val="3186771432"/>
                     </a:ext>
                   </a:extLst>
                 </a:gridCol>
-                <a:gridCol w="1338471">
+                <a:gridCol w="1492358">
                   <a:extLst>
                     <a:ext uri="{9D8B030D-6E8A-4147-A177-3AD203B41FA5}">
                       <a16:colId xmlns:a16="http://schemas.microsoft.com/office/drawing/2014/main" val="1612460789"/>
@@ -7184,7 +7184,7 @@
                       </a:pPr>
                       <a:r>
                         <a:rPr lang="en-US" dirty="0"/>
-                        <a:t>0</a:t>
+                        <a:t>Basic</a:t>
                       </a:r>
                       <a:endParaRPr lang="hr-HR" dirty="0"/>
                     </a:p>
@@ -7358,7 +7358,7 @@
                       <a:pPr algn="ctr"/>
                       <a:r>
                         <a:rPr lang="en-US" dirty="0"/>
-                        <a:t>0</a:t>
+                        <a:t>Basic</a:t>
                       </a:r>
                       <a:endParaRPr lang="hr-HR" dirty="0"/>
                     </a:p>
@@ -7500,7 +7500,7 @@
                       <a:pPr algn="ctr"/>
                       <a:r>
                         <a:rPr lang="en-US" dirty="0"/>
-                        <a:t>0</a:t>
+                        <a:t>Basic</a:t>
                       </a:r>
                       <a:endParaRPr lang="hr-HR" dirty="0"/>
                     </a:p>
@@ -7642,7 +7642,7 @@
                       <a:pPr algn="ctr"/>
                       <a:r>
                         <a:rPr lang="en-US" dirty="0"/>
-                        <a:t>0</a:t>
+                        <a:t>Basic</a:t>
                       </a:r>
                       <a:endParaRPr lang="hr-HR" dirty="0"/>
                     </a:p>
@@ -7800,7 +7800,7 @@
                       </a:pPr>
                       <a:r>
                         <a:rPr lang="en-US" dirty="0"/>
-                        <a:t>0</a:t>
+                        <a:t>Basic</a:t>
                       </a:r>
                       <a:endParaRPr lang="hr-HR" dirty="0"/>
                     </a:p>
@@ -7990,7 +7990,7 @@
                       </a:pPr>
                       <a:r>
                         <a:rPr lang="en-US" dirty="0"/>
-                        <a:t>1</a:t>
+                        <a:t>Special offer</a:t>
                       </a:r>
                       <a:endParaRPr lang="hr-HR" dirty="0"/>
                     </a:p>
@@ -8144,83 +8144,6 @@
           </a:graphicData>
         </a:graphic>
       </p:graphicFrame>
-      <p:sp>
-        <p:nvSpPr>
-          <p:cNvPr id="3" name="TextBox 2">
-            <a:extLst>
-              <a:ext uri="{FF2B5EF4-FFF2-40B4-BE49-F238E27FC236}">
-                <a16:creationId xmlns:a16="http://schemas.microsoft.com/office/drawing/2014/main" id="{F61E69E0-49E4-4861-AB34-F2AE2220FB2A}"/>
-              </a:ext>
-            </a:extLst>
-          </p:cNvPr>
-          <p:cNvSpPr txBox="1"/>
-          <p:nvPr/>
-        </p:nvSpPr>
-        <p:spPr>
-          <a:xfrm>
-            <a:off x="698247" y="5832388"/>
-            <a:ext cx="3632886" cy="369332"/>
-          </a:xfrm>
-          <a:prstGeom prst="rect">
-            <a:avLst/>
-          </a:prstGeom>
-          <a:noFill/>
-        </p:spPr>
-        <p:txBody>
-          <a:bodyPr wrap="square" rtlCol="0">
-            <a:spAutoFit/>
-          </a:bodyPr>
-          <a:lstStyle/>
-          <a:p>
-            <a:r>
-              <a:rPr lang="en-US" dirty="0"/>
-              <a:t>0-&gt;Normal offer, 1-&gt;Special offer</a:t>
-            </a:r>
-            <a:endParaRPr lang="hr-HR" dirty="0"/>
-          </a:p>
-        </p:txBody>
-      </p:sp>
-      <p:cxnSp>
-        <p:nvCxnSpPr>
-          <p:cNvPr id="6" name="Straight Arrow Connector 5">
-            <a:extLst>
-              <a:ext uri="{FF2B5EF4-FFF2-40B4-BE49-F238E27FC236}">
-                <a16:creationId xmlns:a16="http://schemas.microsoft.com/office/drawing/2014/main" id="{EF55C1BA-B742-4EDB-8B7F-ADE364A3F1D9}"/>
-              </a:ext>
-            </a:extLst>
-          </p:cNvPr>
-          <p:cNvCxnSpPr>
-            <a:cxnSpLocks/>
-          </p:cNvCxnSpPr>
-          <p:nvPr/>
-        </p:nvCxnSpPr>
-        <p:spPr>
-          <a:xfrm flipV="1">
-            <a:off x="2354052" y="5299904"/>
-            <a:ext cx="0" cy="532484"/>
-          </a:xfrm>
-          <a:prstGeom prst="straightConnector1">
-            <a:avLst/>
-          </a:prstGeom>
-          <a:ln w="28575">
-            <a:tailEnd type="triangle"/>
-          </a:ln>
-        </p:spPr>
-        <p:style>
-          <a:lnRef idx="1">
-            <a:schemeClr val="accent1"/>
-          </a:lnRef>
-          <a:fillRef idx="0">
-            <a:schemeClr val="accent1"/>
-          </a:fillRef>
-          <a:effectRef idx="0">
-            <a:schemeClr val="accent1"/>
-          </a:effectRef>
-          <a:fontRef idx="minor">
-            <a:schemeClr val="tx1"/>
-          </a:fontRef>
-        </p:style>
-      </p:cxnSp>
     </p:spTree>
     <p:extLst>
       <p:ext uri="{BB962C8B-B14F-4D97-AF65-F5344CB8AC3E}">

</xml_diff>